<commit_message>
Modificaciones Reporte de monitoreo Mayo
</commit_message>
<xml_diff>
--- a/qualtcom/Organizacional/Medicion y Monitoreo/Reporte Monitoreo-150529.pptx
+++ b/qualtcom/Organizacional/Medicion y Monitoreo/Reporte Monitoreo-150529.pptx
@@ -18,6 +18,7 @@
     <p:sldId id="267" r:id="rId12"/>
     <p:sldId id="269" r:id="rId13"/>
     <p:sldId id="268" r:id="rId14"/>
+    <p:sldId id="270" r:id="rId15"/>
   </p:sldIdLst>
   <p:sldSz cx="9144000" cy="6858000" type="screen4x3"/>
   <p:notesSz cx="7772400" cy="10058400"/>
@@ -159,162 +160,12 @@
               <a:defRPr/>
             </a:pPr>
             <a:r>
-              <a:rPr lang="en-US"/>
-              <a:t>Desviación</a:t>
-            </a:r>
-          </a:p>
-        </c:rich>
-      </c:tx>
-      <c:layout/>
-      <c:overlay val="0"/>
-    </c:title>
-    <c:autoTitleDeleted val="0"/>
-    <c:plotArea>
-      <c:layout/>
-      <c:barChart>
-        <c:barDir val="col"/>
-        <c:grouping val="clustered"/>
-        <c:varyColors val="0"/>
-        <c:ser>
-          <c:idx val="0"/>
-          <c:order val="0"/>
-          <c:tx>
-            <c:strRef>
-              <c:f>'Desviacion de costos'!$E$18:$E$19</c:f>
-              <c:strCache>
-                <c:ptCount val="2"/>
-                <c:pt idx="1">
-                  <c:v>Desviación</c:v>
-                </c:pt>
-              </c:strCache>
-            </c:strRef>
-          </c:tx>
-          <c:invertIfNegative val="0"/>
-          <c:cat>
-            <c:strRef>
-              <c:f>'Desviacion de costos'!$B$20:$B$21</c:f>
-              <c:strCache>
-                <c:ptCount val="2"/>
-                <c:pt idx="0">
-                  <c:v>Entrega de Servicio</c:v>
-                </c:pt>
-                <c:pt idx="1">
-                  <c:v>Planeación</c:v>
-                </c:pt>
-              </c:strCache>
-            </c:strRef>
-          </c:cat>
-          <c:val>
-            <c:numRef>
-              <c:f>'Desviacion de costos'!$E$20:$E$21</c:f>
-              <c:numCache>
-                <c:formatCode>0%</c:formatCode>
-                <c:ptCount val="2"/>
-                <c:pt idx="0">
-                  <c:v>0.68535484424611692</c:v>
-                </c:pt>
-                <c:pt idx="1">
-                  <c:v>0.84875187267397645</c:v>
-                </c:pt>
-              </c:numCache>
-            </c:numRef>
-          </c:val>
-          <c:extLst>
-            <c:ext xmlns:c16="http://schemas.microsoft.com/office/drawing/2014/chart" uri="{C3380CC4-5D6E-409C-BE32-E72D297353CC}">
-              <c16:uniqueId val="{00000000-4C53-4413-9153-0DEA66086AD7}"/>
-            </c:ext>
-          </c:extLst>
-        </c:ser>
-        <c:dLbls>
-          <c:showLegendKey val="0"/>
-          <c:showVal val="0"/>
-          <c:showCatName val="0"/>
-          <c:showSerName val="0"/>
-          <c:showPercent val="0"/>
-          <c:showBubbleSize val="0"/>
-        </c:dLbls>
-        <c:gapWidth val="150"/>
-        <c:axId val="139402720"/>
-        <c:axId val="218851136"/>
-      </c:barChart>
-      <c:catAx>
-        <c:axId val="139402720"/>
-        <c:scaling>
-          <c:orientation val="minMax"/>
-        </c:scaling>
-        <c:delete val="0"/>
-        <c:axPos val="b"/>
-        <c:numFmt formatCode="General" sourceLinked="0"/>
-        <c:majorTickMark val="out"/>
-        <c:minorTickMark val="none"/>
-        <c:tickLblPos val="nextTo"/>
-        <c:crossAx val="218851136"/>
-        <c:crosses val="autoZero"/>
-        <c:auto val="1"/>
-        <c:lblAlgn val="ctr"/>
-        <c:lblOffset val="100"/>
-        <c:noMultiLvlLbl val="0"/>
-      </c:catAx>
-      <c:valAx>
-        <c:axId val="218851136"/>
-        <c:scaling>
-          <c:orientation val="minMax"/>
-          <c:max val="1"/>
-          <c:min val="0"/>
-        </c:scaling>
-        <c:delete val="0"/>
-        <c:axPos val="l"/>
-        <c:majorGridlines/>
-        <c:numFmt formatCode="0%" sourceLinked="1"/>
-        <c:majorTickMark val="out"/>
-        <c:minorTickMark val="none"/>
-        <c:tickLblPos val="nextTo"/>
-        <c:crossAx val="139402720"/>
-        <c:crosses val="autoZero"/>
-        <c:crossBetween val="between"/>
-      </c:valAx>
-    </c:plotArea>
-    <c:plotVisOnly val="1"/>
-    <c:dispBlanksAs val="gap"/>
-    <c:showDLblsOverMax val="0"/>
-  </c:chart>
-  <c:externalData r:id="rId1">
-    <c:autoUpdate val="0"/>
-  </c:externalData>
-</c:chartSpace>
-</file>
-
-<file path=ppt/charts/chart2.xml><?xml version="1.0" encoding="utf-8"?>
-<c:chartSpace xmlns:c="http://schemas.openxmlformats.org/drawingml/2006/chart" xmlns:a="http://schemas.openxmlformats.org/drawingml/2006/main" xmlns:r="http://schemas.openxmlformats.org/officeDocument/2006/relationships">
-  <c:date1904 val="0"/>
-  <c:lang val="es-ES"/>
-  <c:roundedCorners val="0"/>
-  <mc:AlternateContent xmlns:mc="http://schemas.openxmlformats.org/markup-compatibility/2006">
-    <mc:Choice xmlns:c14="http://schemas.microsoft.com/office/drawing/2007/8/2/chart" Requires="c14">
-      <c14:style val="102"/>
-    </mc:Choice>
-    <mc:Fallback>
-      <c:style val="2"/>
-    </mc:Fallback>
-  </mc:AlternateContent>
-  <c:chart>
-    <c:title>
-      <c:tx>
-        <c:rich>
-          <a:bodyPr/>
-          <a:lstStyle/>
-          <a:p>
-            <a:pPr>
-              <a:defRPr/>
-            </a:pPr>
-            <a:r>
               <a:rPr lang="es-MX"/>
               <a:t>Costo</a:t>
             </a:r>
           </a:p>
         </c:rich>
       </c:tx>
-      <c:layout/>
       <c:overlay val="0"/>
     </c:title>
     <c:autoTitleDeleted val="0"/>
@@ -360,7 +211,7 @@
                 <c:formatCode>_-"$"* #,##0.00_-;\-"$"* #,##0.00_-;_-"$"* "-"??_-;_-@_-</c:formatCode>
                 <c:ptCount val="2"/>
                 <c:pt idx="0">
-                  <c:v>11653</c:v>
+                  <c:v>9989</c:v>
                 </c:pt>
                 <c:pt idx="1">
                   <c:v>5693.7300000000005</c:v>
@@ -410,7 +261,7 @@
                 <c:formatCode>_-"$"* #,##0.00_-;\-"$"* #,##0.00_-;_-"$"* "-"??_-;_-@_-</c:formatCode>
                 <c:ptCount val="2"/>
                 <c:pt idx="0">
-                  <c:v>3666.56</c:v>
+                  <c:v>1415.08</c:v>
                 </c:pt>
                 <c:pt idx="1">
                   <c:v>861.16600000000005</c:v>
@@ -433,11 +284,11 @@
           <c:showBubbleSize val="0"/>
         </c:dLbls>
         <c:gapWidth val="150"/>
-        <c:axId val="218858416"/>
-        <c:axId val="218861216"/>
+        <c:axId val="162037968"/>
+        <c:axId val="162038528"/>
       </c:barChart>
       <c:catAx>
-        <c:axId val="218858416"/>
+        <c:axId val="162037968"/>
         <c:scaling>
           <c:orientation val="minMax"/>
         </c:scaling>
@@ -447,7 +298,7 @@
         <c:majorTickMark val="none"/>
         <c:minorTickMark val="none"/>
         <c:tickLblPos val="nextTo"/>
-        <c:crossAx val="218861216"/>
+        <c:crossAx val="162038528"/>
         <c:crosses val="autoZero"/>
         <c:auto val="1"/>
         <c:lblAlgn val="ctr"/>
@@ -455,7 +306,7 @@
         <c:noMultiLvlLbl val="0"/>
       </c:catAx>
       <c:valAx>
-        <c:axId val="218861216"/>
+        <c:axId val="162038528"/>
         <c:scaling>
           <c:orientation val="minMax"/>
         </c:scaling>
@@ -466,16 +317,163 @@
         <c:majorTickMark val="none"/>
         <c:minorTickMark val="none"/>
         <c:tickLblPos val="nextTo"/>
-        <c:crossAx val="218858416"/>
+        <c:crossAx val="162037968"/>
         <c:crosses val="autoZero"/>
         <c:crossBetween val="between"/>
       </c:valAx>
     </c:plotArea>
     <c:legend>
       <c:legendPos val="r"/>
-      <c:layout/>
       <c:overlay val="0"/>
     </c:legend>
+    <c:plotVisOnly val="1"/>
+    <c:dispBlanksAs val="gap"/>
+    <c:showDLblsOverMax val="0"/>
+  </c:chart>
+  <c:externalData r:id="rId1">
+    <c:autoUpdate val="0"/>
+  </c:externalData>
+</c:chartSpace>
+</file>
+
+<file path=ppt/charts/chart2.xml><?xml version="1.0" encoding="utf-8"?>
+<c:chartSpace xmlns:c="http://schemas.openxmlformats.org/drawingml/2006/chart" xmlns:a="http://schemas.openxmlformats.org/drawingml/2006/main" xmlns:r="http://schemas.openxmlformats.org/officeDocument/2006/relationships">
+  <c:date1904 val="0"/>
+  <c:lang val="es-ES"/>
+  <c:roundedCorners val="0"/>
+  <mc:AlternateContent xmlns:mc="http://schemas.openxmlformats.org/markup-compatibility/2006">
+    <mc:Choice xmlns:c14="http://schemas.microsoft.com/office/drawing/2007/8/2/chart" Requires="c14">
+      <c14:style val="102"/>
+    </mc:Choice>
+    <mc:Fallback>
+      <c:style val="2"/>
+    </mc:Fallback>
+  </mc:AlternateContent>
+  <c:chart>
+    <c:title>
+      <c:tx>
+        <c:rich>
+          <a:bodyPr/>
+          <a:lstStyle/>
+          <a:p>
+            <a:pPr>
+              <a:defRPr/>
+            </a:pPr>
+            <a:r>
+              <a:rPr lang="en-US"/>
+              <a:t>Desviación</a:t>
+            </a:r>
+          </a:p>
+        </c:rich>
+      </c:tx>
+      <c:overlay val="0"/>
+    </c:title>
+    <c:autoTitleDeleted val="0"/>
+    <c:plotArea>
+      <c:layout/>
+      <c:barChart>
+        <c:barDir val="col"/>
+        <c:grouping val="clustered"/>
+        <c:varyColors val="0"/>
+        <c:ser>
+          <c:idx val="0"/>
+          <c:order val="0"/>
+          <c:tx>
+            <c:strRef>
+              <c:f>'Desviacion de costos'!$E$18:$E$19</c:f>
+              <c:strCache>
+                <c:ptCount val="2"/>
+                <c:pt idx="1">
+                  <c:v>Desviación</c:v>
+                </c:pt>
+              </c:strCache>
+            </c:strRef>
+          </c:tx>
+          <c:invertIfNegative val="0"/>
+          <c:cat>
+            <c:strRef>
+              <c:f>'Desviacion de costos'!$B$20:$B$21</c:f>
+              <c:strCache>
+                <c:ptCount val="2"/>
+                <c:pt idx="0">
+                  <c:v>Entrega de Servicio</c:v>
+                </c:pt>
+                <c:pt idx="1">
+                  <c:v>Planeación</c:v>
+                </c:pt>
+              </c:strCache>
+            </c:strRef>
+          </c:cat>
+          <c:val>
+            <c:numRef>
+              <c:f>'Desviacion de costos'!$E$20:$E$21</c:f>
+              <c:numCache>
+                <c:formatCode>0%</c:formatCode>
+                <c:ptCount val="2"/>
+                <c:pt idx="0">
+                  <c:v>0.85833616978676541</c:v>
+                </c:pt>
+                <c:pt idx="1">
+                  <c:v>0.84875187267397645</c:v>
+                </c:pt>
+              </c:numCache>
+            </c:numRef>
+          </c:val>
+          <c:extLst>
+            <c:ext xmlns:c16="http://schemas.microsoft.com/office/drawing/2014/chart" uri="{C3380CC4-5D6E-409C-BE32-E72D297353CC}">
+              <c16:uniqueId val="{00000000-4C53-4413-9153-0DEA66086AD7}"/>
+            </c:ext>
+          </c:extLst>
+        </c:ser>
+        <c:dLbls>
+          <c:showLegendKey val="0"/>
+          <c:showVal val="0"/>
+          <c:showCatName val="0"/>
+          <c:showSerName val="0"/>
+          <c:showPercent val="0"/>
+          <c:showBubbleSize val="0"/>
+        </c:dLbls>
+        <c:gapWidth val="150"/>
+        <c:axId val="162040768"/>
+        <c:axId val="162041328"/>
+      </c:barChart>
+      <c:catAx>
+        <c:axId val="162040768"/>
+        <c:scaling>
+          <c:orientation val="minMax"/>
+        </c:scaling>
+        <c:delete val="0"/>
+        <c:axPos val="b"/>
+        <c:numFmt formatCode="General" sourceLinked="0"/>
+        <c:majorTickMark val="out"/>
+        <c:minorTickMark val="none"/>
+        <c:tickLblPos val="nextTo"/>
+        <c:crossAx val="162041328"/>
+        <c:crosses val="autoZero"/>
+        <c:auto val="1"/>
+        <c:lblAlgn val="ctr"/>
+        <c:lblOffset val="100"/>
+        <c:noMultiLvlLbl val="0"/>
+      </c:catAx>
+      <c:valAx>
+        <c:axId val="162041328"/>
+        <c:scaling>
+          <c:orientation val="minMax"/>
+          <c:max val="1"/>
+          <c:min val="0"/>
+        </c:scaling>
+        <c:delete val="0"/>
+        <c:axPos val="l"/>
+        <c:majorGridlines/>
+        <c:numFmt formatCode="0%" sourceLinked="1"/>
+        <c:majorTickMark val="out"/>
+        <c:minorTickMark val="none"/>
+        <c:tickLblPos val="nextTo"/>
+        <c:crossAx val="162040768"/>
+        <c:crosses val="autoZero"/>
+        <c:crossBetween val="between"/>
+      </c:valAx>
+    </c:plotArea>
     <c:plotVisOnly val="1"/>
     <c:dispBlanksAs val="gap"/>
     <c:showDLblsOverMax val="0"/>
@@ -516,7 +514,6 @@
           </a:p>
         </c:rich>
       </c:tx>
-      <c:layout/>
       <c:overlay val="0"/>
     </c:title>
     <c:autoTitleDeleted val="0"/>
@@ -587,10 +584,10 @@
                 <c:formatCode>General</c:formatCode>
                 <c:ptCount val="7"/>
                 <c:pt idx="0">
-                  <c:v>140</c:v>
+                  <c:v>91.2</c:v>
                 </c:pt>
                 <c:pt idx="1">
-                  <c:v>140</c:v>
+                  <c:v>45.6</c:v>
                 </c:pt>
                 <c:pt idx="2">
                   <c:v>45.600000000000009</c:v>
@@ -715,11 +712,11 @@
           <c:showBubbleSize val="0"/>
         </c:dLbls>
         <c:gapWidth val="150"/>
-        <c:axId val="218853936"/>
-        <c:axId val="218864016"/>
+        <c:axId val="164670496"/>
+        <c:axId val="164671056"/>
       </c:barChart>
       <c:catAx>
-        <c:axId val="218853936"/>
+        <c:axId val="164670496"/>
         <c:scaling>
           <c:orientation val="minMax"/>
         </c:scaling>
@@ -729,7 +726,7 @@
         <c:majorTickMark val="none"/>
         <c:minorTickMark val="none"/>
         <c:tickLblPos val="nextTo"/>
-        <c:crossAx val="218864016"/>
+        <c:crossAx val="164671056"/>
         <c:crosses val="autoZero"/>
         <c:auto val="1"/>
         <c:lblAlgn val="ctr"/>
@@ -737,7 +734,7 @@
         <c:noMultiLvlLbl val="0"/>
       </c:catAx>
       <c:valAx>
-        <c:axId val="218864016"/>
+        <c:axId val="164671056"/>
         <c:scaling>
           <c:orientation val="minMax"/>
         </c:scaling>
@@ -748,14 +745,13 @@
         <c:majorTickMark val="none"/>
         <c:minorTickMark val="none"/>
         <c:tickLblPos val="nextTo"/>
-        <c:crossAx val="218853936"/>
+        <c:crossAx val="164670496"/>
         <c:crosses val="autoZero"/>
         <c:crossBetween val="between"/>
       </c:valAx>
     </c:plotArea>
     <c:legend>
       <c:legendPos val="r"/>
-      <c:layout/>
       <c:overlay val="0"/>
     </c:legend>
     <c:plotVisOnly val="1"/>
@@ -798,7 +794,6 @@
           </a:p>
         </c:rich>
       </c:tx>
-      <c:layout/>
       <c:overlay val="0"/>
     </c:title>
     <c:autoTitleDeleted val="0"/>
@@ -879,10 +874,10 @@
                 <c:formatCode>0%</c:formatCode>
                 <c:ptCount val="7"/>
                 <c:pt idx="0">
-                  <c:v>0.7857142857142857</c:v>
+                  <c:v>0.67105263157894735</c:v>
                 </c:pt>
                 <c:pt idx="1">
-                  <c:v>0.97142857142857142</c:v>
+                  <c:v>0.91228070175438591</c:v>
                 </c:pt>
                 <c:pt idx="2">
                   <c:v>0.82456140350877194</c:v>
@@ -917,11 +912,11 @@
           <c:showBubbleSize val="0"/>
         </c:dLbls>
         <c:gapWidth val="150"/>
-        <c:axId val="218857856"/>
-        <c:axId val="181914864"/>
+        <c:axId val="164673296"/>
+        <c:axId val="164673856"/>
       </c:barChart>
       <c:catAx>
-        <c:axId val="218857856"/>
+        <c:axId val="164673296"/>
         <c:scaling>
           <c:orientation val="minMax"/>
         </c:scaling>
@@ -931,7 +926,7 @@
         <c:majorTickMark val="out"/>
         <c:minorTickMark val="none"/>
         <c:tickLblPos val="nextTo"/>
-        <c:crossAx val="181914864"/>
+        <c:crossAx val="164673856"/>
         <c:crosses val="autoZero"/>
         <c:auto val="1"/>
         <c:lblAlgn val="ctr"/>
@@ -939,7 +934,7 @@
         <c:noMultiLvlLbl val="0"/>
       </c:catAx>
       <c:valAx>
-        <c:axId val="181914864"/>
+        <c:axId val="164673856"/>
         <c:scaling>
           <c:orientation val="minMax"/>
           <c:max val="1"/>
@@ -952,7 +947,7 @@
         <c:majorTickMark val="out"/>
         <c:minorTickMark val="none"/>
         <c:tickLblPos val="nextTo"/>
-        <c:crossAx val="218857856"/>
+        <c:crossAx val="164673296"/>
         <c:crosses val="autoZero"/>
         <c:crossBetween val="between"/>
       </c:valAx>
@@ -997,7 +992,6 @@
           </a:p>
         </c:rich>
       </c:tx>
-      <c:layout/>
       <c:overlay val="0"/>
     </c:title>
     <c:autoTitleDeleted val="0"/>
@@ -1061,11 +1055,11 @@
           <c:showBubbleSize val="0"/>
         </c:dLbls>
         <c:gapWidth val="150"/>
-        <c:axId val="189937264"/>
-        <c:axId val="189937824"/>
+        <c:axId val="164676096"/>
+        <c:axId val="164676656"/>
       </c:barChart>
       <c:catAx>
-        <c:axId val="189937264"/>
+        <c:axId val="164676096"/>
         <c:scaling>
           <c:orientation val="minMax"/>
         </c:scaling>
@@ -1075,7 +1069,7 @@
         <c:majorTickMark val="none"/>
         <c:minorTickMark val="none"/>
         <c:tickLblPos val="nextTo"/>
-        <c:crossAx val="189937824"/>
+        <c:crossAx val="164676656"/>
         <c:crosses val="autoZero"/>
         <c:auto val="1"/>
         <c:lblAlgn val="ctr"/>
@@ -1083,7 +1077,7 @@
         <c:noMultiLvlLbl val="0"/>
       </c:catAx>
       <c:valAx>
-        <c:axId val="189937824"/>
+        <c:axId val="164676656"/>
         <c:scaling>
           <c:orientation val="minMax"/>
           <c:max val="1"/>
@@ -1095,7 +1089,7 @@
         <c:majorTickMark val="none"/>
         <c:minorTickMark val="none"/>
         <c:tickLblPos val="nextTo"/>
-        <c:crossAx val="189937264"/>
+        <c:crossAx val="164676096"/>
         <c:crosses val="autoZero"/>
         <c:crossBetween val="between"/>
       </c:valAx>
@@ -1146,7 +1140,6 @@
           </a:p>
         </c:rich>
       </c:tx>
-      <c:layout/>
       <c:overlay val="0"/>
     </c:title>
     <c:autoTitleDeleted val="0"/>
@@ -1210,11 +1203,11 @@
           <c:showBubbleSize val="0"/>
         </c:dLbls>
         <c:gapWidth val="150"/>
-        <c:axId val="225145632"/>
-        <c:axId val="225152352"/>
+        <c:axId val="164522912"/>
+        <c:axId val="164523472"/>
       </c:barChart>
       <c:catAx>
-        <c:axId val="225145632"/>
+        <c:axId val="164522912"/>
         <c:scaling>
           <c:orientation val="minMax"/>
         </c:scaling>
@@ -1224,7 +1217,7 @@
         <c:majorTickMark val="none"/>
         <c:minorTickMark val="none"/>
         <c:tickLblPos val="nextTo"/>
-        <c:crossAx val="225152352"/>
+        <c:crossAx val="164523472"/>
         <c:crosses val="autoZero"/>
         <c:auto val="1"/>
         <c:lblAlgn val="ctr"/>
@@ -1232,7 +1225,7 @@
         <c:noMultiLvlLbl val="0"/>
       </c:catAx>
       <c:valAx>
-        <c:axId val="225152352"/>
+        <c:axId val="164523472"/>
         <c:scaling>
           <c:orientation val="minMax"/>
           <c:max val="1"/>
@@ -1244,7 +1237,7 @@
         <c:majorTickMark val="none"/>
         <c:minorTickMark val="none"/>
         <c:tickLblPos val="nextTo"/>
-        <c:crossAx val="225145632"/>
+        <c:crossAx val="164522912"/>
         <c:crosses val="autoZero"/>
         <c:crossBetween val="between"/>
       </c:valAx>
@@ -1295,7 +1288,6 @@
           </a:p>
         </c:rich>
       </c:tx>
-      <c:layout/>
       <c:overlay val="0"/>
     </c:title>
     <c:autoTitleDeleted val="0"/>
@@ -1365,11 +1357,11 @@
           <c:showBubbleSize val="0"/>
         </c:dLbls>
         <c:gapWidth val="150"/>
-        <c:axId val="189943984"/>
-        <c:axId val="181909824"/>
+        <c:axId val="164526272"/>
+        <c:axId val="164526832"/>
       </c:barChart>
       <c:catAx>
-        <c:axId val="189943984"/>
+        <c:axId val="164526272"/>
         <c:scaling>
           <c:orientation val="minMax"/>
         </c:scaling>
@@ -1379,7 +1371,7 @@
         <c:majorTickMark val="none"/>
         <c:minorTickMark val="none"/>
         <c:tickLblPos val="nextTo"/>
-        <c:crossAx val="181909824"/>
+        <c:crossAx val="164526832"/>
         <c:crosses val="autoZero"/>
         <c:auto val="1"/>
         <c:lblAlgn val="ctr"/>
@@ -1387,7 +1379,7 @@
         <c:noMultiLvlLbl val="0"/>
       </c:catAx>
       <c:valAx>
-        <c:axId val="181909824"/>
+        <c:axId val="164526832"/>
         <c:scaling>
           <c:orientation val="minMax"/>
           <c:max val="1"/>
@@ -1399,7 +1391,7 @@
         <c:majorTickMark val="none"/>
         <c:minorTickMark val="none"/>
         <c:tickLblPos val="nextTo"/>
-        <c:crossAx val="189943984"/>
+        <c:crossAx val="164526272"/>
         <c:crosses val="autoZero"/>
         <c:crossBetween val="between"/>
       </c:valAx>
@@ -1450,7 +1442,6 @@
           </a:p>
         </c:rich>
       </c:tx>
-      <c:layout/>
       <c:overlay val="0"/>
     </c:title>
     <c:autoTitleDeleted val="0"/>
@@ -1514,11 +1505,11 @@
           <c:showBubbleSize val="0"/>
         </c:dLbls>
         <c:gapWidth val="150"/>
-        <c:axId val="196540272"/>
-        <c:axId val="196537472"/>
+        <c:axId val="164746304"/>
+        <c:axId val="164746864"/>
       </c:barChart>
       <c:catAx>
-        <c:axId val="196540272"/>
+        <c:axId val="164746304"/>
         <c:scaling>
           <c:orientation val="minMax"/>
         </c:scaling>
@@ -1528,7 +1519,7 @@
         <c:majorTickMark val="none"/>
         <c:minorTickMark val="none"/>
         <c:tickLblPos val="nextTo"/>
-        <c:crossAx val="196537472"/>
+        <c:crossAx val="164746864"/>
         <c:crosses val="autoZero"/>
         <c:auto val="1"/>
         <c:lblAlgn val="ctr"/>
@@ -1536,7 +1527,7 @@
         <c:noMultiLvlLbl val="0"/>
       </c:catAx>
       <c:valAx>
-        <c:axId val="196537472"/>
+        <c:axId val="164746864"/>
         <c:scaling>
           <c:orientation val="minMax"/>
         </c:scaling>
@@ -1547,7 +1538,7 @@
         <c:majorTickMark val="none"/>
         <c:minorTickMark val="none"/>
         <c:tickLblPos val="nextTo"/>
-        <c:crossAx val="196540272"/>
+        <c:crossAx val="164746304"/>
         <c:crosses val="autoZero"/>
         <c:crossBetween val="between"/>
       </c:valAx>
@@ -1603,7 +1594,6 @@
           </a:p>
         </c:rich>
       </c:tx>
-      <c:layout/>
       <c:overlay val="0"/>
     </c:title>
     <c:autoTitleDeleted val="0"/>
@@ -1806,11 +1796,11 @@
           <c:showBubbleSize val="0"/>
         </c:dLbls>
         <c:gapWidth val="150"/>
-        <c:axId val="225138912"/>
-        <c:axId val="225145072"/>
+        <c:axId val="164751344"/>
+        <c:axId val="164751904"/>
       </c:barChart>
       <c:catAx>
-        <c:axId val="225138912"/>
+        <c:axId val="164751344"/>
         <c:scaling>
           <c:orientation val="minMax"/>
         </c:scaling>
@@ -1820,7 +1810,7 @@
         <c:majorTickMark val="none"/>
         <c:minorTickMark val="none"/>
         <c:tickLblPos val="nextTo"/>
-        <c:crossAx val="225145072"/>
+        <c:crossAx val="164751904"/>
         <c:crosses val="autoZero"/>
         <c:auto val="1"/>
         <c:lblAlgn val="ctr"/>
@@ -1828,7 +1818,7 @@
         <c:noMultiLvlLbl val="0"/>
       </c:catAx>
       <c:valAx>
-        <c:axId val="225145072"/>
+        <c:axId val="164751904"/>
         <c:scaling>
           <c:orientation val="minMax"/>
           <c:max val="1"/>
@@ -1840,7 +1830,7 @@
         <c:majorTickMark val="none"/>
         <c:minorTickMark val="none"/>
         <c:tickLblPos val="nextTo"/>
-        <c:crossAx val="225138912"/>
+        <c:crossAx val="164751344"/>
         <c:crosses val="autoZero"/>
         <c:crossBetween val="between"/>
       </c:valAx>
@@ -4734,16 +4724,7 @@
                 </a:solidFill>
                 <a:latin typeface="Calibri"/>
               </a:rPr>
-              <a:t>29</a:t>
-            </a:r>
-            <a:r>
-              <a:rPr lang="es-MX" sz="3200" dirty="0" smtClean="0">
-                <a:solidFill>
-                  <a:srgbClr val="8B8B8B"/>
-                </a:solidFill>
-                <a:latin typeface="Calibri"/>
-              </a:rPr>
-              <a:t>/05/2015</a:t>
+              <a:t>29/05/2015</a:t>
             </a:r>
             <a:endParaRPr dirty="0"/>
           </a:p>
@@ -5021,21 +5002,21 @@
       </p:sp>
       <p:graphicFrame>
         <p:nvGraphicFramePr>
-          <p:cNvPr id="2" name="Tabla 1"/>
+          <p:cNvPr id="3" name="Tabla 2"/>
           <p:cNvGraphicFramePr>
             <a:graphicFrameLocks noGrp="1"/>
           </p:cNvGraphicFramePr>
           <p:nvPr>
             <p:extLst>
               <p:ext uri="{D42A27DB-BD31-4B8C-83A1-F6EECF244321}">
-                <p14:modId xmlns:p14="http://schemas.microsoft.com/office/powerpoint/2010/main" val="3258885907"/>
+                <p14:modId xmlns:p14="http://schemas.microsoft.com/office/powerpoint/2010/main" val="2528583917"/>
               </p:ext>
             </p:extLst>
           </p:nvPr>
         </p:nvGraphicFramePr>
         <p:xfrm>
-          <a:off x="648920" y="1700808"/>
-          <a:ext cx="8482861" cy="2311369"/>
+          <a:off x="457200" y="1385817"/>
+          <a:ext cx="8686802" cy="4335241"/>
         </p:xfrm>
         <a:graphic>
           <a:graphicData uri="http://schemas.openxmlformats.org/drawingml/2006/table">
@@ -5044,18 +5025,18 @@
                 <a:tableStyleId>{5C22544A-7EE6-4342-B048-85BDC9FD1C3A}</a:tableStyleId>
               </a:tblPr>
               <a:tblGrid>
-                <a:gridCol w="131287"/>
-                <a:gridCol w="1703561"/>
-                <a:gridCol w="432048"/>
-                <a:gridCol w="720080"/>
-                <a:gridCol w="576064"/>
-                <a:gridCol w="576064"/>
-                <a:gridCol w="1512168"/>
-                <a:gridCol w="1679462"/>
-                <a:gridCol w="696802"/>
-                <a:gridCol w="455325"/>
+                <a:gridCol w="135335"/>
+                <a:gridCol w="1581725"/>
+                <a:gridCol w="634382"/>
+                <a:gridCol w="634382"/>
+                <a:gridCol w="634382"/>
+                <a:gridCol w="634382"/>
+                <a:gridCol w="1581725"/>
+                <a:gridCol w="1581725"/>
+                <a:gridCol w="634382"/>
+                <a:gridCol w="634382"/>
               </a:tblGrid>
-              <a:tr h="360040">
+              <a:tr h="235953">
                 <a:tc>
                   <a:txBody>
                     <a:bodyPr/>
@@ -5063,10 +5044,33 @@
                     <a:p>
                       <a:pPr algn="ctr" fontAlgn="ctr"/>
                       <a:r>
+                        <a:rPr lang="es-MX" sz="700" u="none" strike="noStrike" dirty="0">
+                          <a:effectLst/>
+                        </a:rPr>
+                        <a:t>ID</a:t>
+                      </a:r>
+                      <a:endParaRPr lang="es-MX" sz="700" b="1" i="0" u="none" strike="noStrike" dirty="0">
+                        <a:solidFill>
+                          <a:srgbClr val="000000"/>
+                        </a:solidFill>
+                        <a:effectLst/>
+                        <a:latin typeface="Calibri" panose="020F0502020204030204" pitchFamily="34" charset="0"/>
+                      </a:endParaRPr>
+                    </a:p>
+                  </a:txBody>
+                  <a:tcPr marL="0" marR="0" marT="0" marB="0" anchor="ctr"/>
+                </a:tc>
+                <a:tc>
+                  <a:txBody>
+                    <a:bodyPr/>
+                    <a:lstStyle/>
+                    <a:p>
+                      <a:pPr algn="l" fontAlgn="t"/>
+                      <a:r>
                         <a:rPr lang="es-MX" sz="700" u="none" strike="noStrike">
                           <a:effectLst/>
                         </a:rPr>
-                        <a:t>ID</a:t>
+                        <a:t>DESCRIPCIÓN DEL RIESGO</a:t>
                       </a:r>
                       <a:endParaRPr lang="es-MX" sz="700" b="1" i="0" u="none" strike="noStrike">
                         <a:solidFill>
@@ -5077,6 +5081,29 @@
                       </a:endParaRPr>
                     </a:p>
                   </a:txBody>
+                  <a:tcPr marL="0" marR="0" marT="0" marB="0"/>
+                </a:tc>
+                <a:tc>
+                  <a:txBody>
+                    <a:bodyPr/>
+                    <a:lstStyle/>
+                    <a:p>
+                      <a:pPr algn="ctr" fontAlgn="ctr"/>
+                      <a:r>
+                        <a:rPr lang="es-MX" sz="700" u="none" strike="noStrike">
+                          <a:effectLst/>
+                        </a:rPr>
+                        <a:t>IMPACTO</a:t>
+                      </a:r>
+                      <a:endParaRPr lang="es-MX" sz="700" b="1" i="0" u="none" strike="noStrike">
+                        <a:solidFill>
+                          <a:srgbClr val="000000"/>
+                        </a:solidFill>
+                        <a:effectLst/>
+                        <a:latin typeface="Calibri" panose="020F0502020204030204" pitchFamily="34" charset="0"/>
+                      </a:endParaRPr>
+                    </a:p>
+                  </a:txBody>
                   <a:tcPr marL="0" marR="0" marT="0" marB="0" anchor="ctr"/>
                 </a:tc>
                 <a:tc>
@@ -5084,12 +5111,12 @@
                     <a:bodyPr/>
                     <a:lstStyle/>
                     <a:p>
-                      <a:pPr algn="l" fontAlgn="t"/>
+                      <a:pPr algn="ctr" fontAlgn="ctr"/>
                       <a:r>
                         <a:rPr lang="es-MX" sz="700" u="none" strike="noStrike">
                           <a:effectLst/>
                         </a:rPr>
-                        <a:t>DESCRIPCIÓN DEL RIESGO</a:t>
+                        <a:t>PROBABILIDAD</a:t>
                       </a:r>
                       <a:endParaRPr lang="es-MX" sz="700" b="1" i="0" u="none" strike="noStrike">
                         <a:solidFill>
@@ -5100,7 +5127,7 @@
                       </a:endParaRPr>
                     </a:p>
                   </a:txBody>
-                  <a:tcPr marL="0" marR="0" marT="0" marB="0"/>
+                  <a:tcPr marL="0" marR="0" marT="0" marB="0" anchor="ctr"/>
                 </a:tc>
                 <a:tc>
                   <a:txBody>
@@ -5109,12 +5136,12 @@
                     <a:p>
                       <a:pPr algn="ctr" fontAlgn="ctr"/>
                       <a:r>
-                        <a:rPr lang="es-MX" sz="700" u="none" strike="noStrike" dirty="0">
-                          <a:effectLst/>
-                        </a:rPr>
-                        <a:t>IMPACTO</a:t>
-                      </a:r>
-                      <a:endParaRPr lang="es-MX" sz="700" b="1" i="0" u="none" strike="noStrike" dirty="0">
+                        <a:rPr lang="es-MX" sz="700" u="none" strike="noStrike">
+                          <a:effectLst/>
+                        </a:rPr>
+                        <a:t>EXPOSICIÓN</a:t>
+                      </a:r>
+                      <a:endParaRPr lang="es-MX" sz="700" b="1" i="0" u="none" strike="noStrike">
                         <a:solidFill>
                           <a:srgbClr val="000000"/>
                         </a:solidFill>
@@ -5135,7 +5162,7 @@
                         <a:rPr lang="es-MX" sz="700" u="none" strike="noStrike">
                           <a:effectLst/>
                         </a:rPr>
-                        <a:t>PROBABILIDAD</a:t>
+                        <a:t>PRIORIDAD</a:t>
                       </a:r>
                       <a:endParaRPr lang="es-MX" sz="700" b="1" i="0" u="none" strike="noStrike">
                         <a:solidFill>
@@ -5158,7 +5185,7 @@
                         <a:rPr lang="es-MX" sz="700" u="none" strike="noStrike">
                           <a:effectLst/>
                         </a:rPr>
-                        <a:t>EXPOSICIÓN</a:t>
+                        <a:t>PLAN DE MITIGACIÓN</a:t>
                       </a:r>
                       <a:endParaRPr lang="es-MX" sz="700" b="1" i="0" u="none" strike="noStrike">
                         <a:solidFill>
@@ -5181,7 +5208,7 @@
                         <a:rPr lang="es-MX" sz="700" u="none" strike="noStrike">
                           <a:effectLst/>
                         </a:rPr>
-                        <a:t>PRIORIDAD</a:t>
+                        <a:t>PLAN DE CONTINGENCIA</a:t>
                       </a:r>
                       <a:endParaRPr lang="es-MX" sz="700" b="1" i="0" u="none" strike="noStrike">
                         <a:solidFill>
@@ -5204,7 +5231,7 @@
                         <a:rPr lang="es-MX" sz="700" u="none" strike="noStrike">
                           <a:effectLst/>
                         </a:rPr>
-                        <a:t>PLAN DE MITIGACIÓN</a:t>
+                        <a:t>RESPONSABLE</a:t>
                       </a:r>
                       <a:endParaRPr lang="es-MX" sz="700" b="1" i="0" u="none" strike="noStrike">
                         <a:solidFill>
@@ -5227,7 +5254,7 @@
                         <a:rPr lang="es-MX" sz="700" u="none" strike="noStrike">
                           <a:effectLst/>
                         </a:rPr>
-                        <a:t>PLAN DE CONTINGENCIA</a:t>
+                        <a:t>STATUS</a:t>
                       </a:r>
                       <a:endParaRPr lang="es-MX" sz="700" b="1" i="0" u="none" strike="noStrike">
                         <a:solidFill>
@@ -5240,54 +5267,8 @@
                   </a:txBody>
                   <a:tcPr marL="0" marR="0" marT="0" marB="0" anchor="ctr"/>
                 </a:tc>
-                <a:tc>
-                  <a:txBody>
-                    <a:bodyPr/>
-                    <a:lstStyle/>
-                    <a:p>
-                      <a:pPr algn="ctr" fontAlgn="ctr"/>
-                      <a:r>
-                        <a:rPr lang="es-MX" sz="700" u="none" strike="noStrike">
-                          <a:effectLst/>
-                        </a:rPr>
-                        <a:t>RESPONSABLE</a:t>
-                      </a:r>
-                      <a:endParaRPr lang="es-MX" sz="700" b="1" i="0" u="none" strike="noStrike">
-                        <a:solidFill>
-                          <a:srgbClr val="000000"/>
-                        </a:solidFill>
-                        <a:effectLst/>
-                        <a:latin typeface="Calibri" panose="020F0502020204030204" pitchFamily="34" charset="0"/>
-                      </a:endParaRPr>
-                    </a:p>
-                  </a:txBody>
-                  <a:tcPr marL="0" marR="0" marT="0" marB="0" anchor="ctr"/>
-                </a:tc>
-                <a:tc>
-                  <a:txBody>
-                    <a:bodyPr/>
-                    <a:lstStyle/>
-                    <a:p>
-                      <a:pPr algn="ctr" fontAlgn="ctr"/>
-                      <a:r>
-                        <a:rPr lang="es-MX" sz="700" u="none" strike="noStrike">
-                          <a:effectLst/>
-                        </a:rPr>
-                        <a:t>STATUS</a:t>
-                      </a:r>
-                      <a:endParaRPr lang="es-MX" sz="700" b="1" i="0" u="none" strike="noStrike">
-                        <a:solidFill>
-                          <a:srgbClr val="000000"/>
-                        </a:solidFill>
-                        <a:effectLst/>
-                        <a:latin typeface="Calibri" panose="020F0502020204030204" pitchFamily="34" charset="0"/>
-                      </a:endParaRPr>
-                    </a:p>
-                  </a:txBody>
-                  <a:tcPr marL="0" marR="0" marT="0" marB="0" anchor="ctr"/>
-                </a:tc>
               </a:tr>
-              <a:tr h="1170797">
+              <a:tr h="779867">
                 <a:tc>
                   <a:txBody>
                     <a:bodyPr/>
@@ -5516,6 +5497,1398 @@
                         <a:rPr lang="es-MX" sz="700" u="none" strike="noStrike">
                           <a:effectLst/>
                         </a:rPr>
+                        <a:t>Mitigado</a:t>
+                      </a:r>
+                      <a:endParaRPr lang="es-MX" sz="700" b="0" i="0" u="none" strike="noStrike">
+                        <a:solidFill>
+                          <a:srgbClr val="000000"/>
+                        </a:solidFill>
+                        <a:effectLst/>
+                        <a:latin typeface="Calibri" panose="020F0502020204030204" pitchFamily="34" charset="0"/>
+                      </a:endParaRPr>
+                    </a:p>
+                  </a:txBody>
+                  <a:tcPr marL="0" marR="0" marT="0" marB="0" anchor="ctr"/>
+                </a:tc>
+              </a:tr>
+              <a:tr h="589883">
+                <a:tc>
+                  <a:txBody>
+                    <a:bodyPr/>
+                    <a:lstStyle/>
+                    <a:p>
+                      <a:pPr algn="ctr" fontAlgn="ctr"/>
+                      <a:r>
+                        <a:rPr lang="es-MX" sz="700" u="none" strike="noStrike">
+                          <a:effectLst/>
+                        </a:rPr>
+                        <a:t>2</a:t>
+                      </a:r>
+                      <a:endParaRPr lang="es-MX" sz="700" b="0" i="0" u="none" strike="noStrike">
+                        <a:solidFill>
+                          <a:srgbClr val="000000"/>
+                        </a:solidFill>
+                        <a:effectLst/>
+                        <a:latin typeface="Calibri" panose="020F0502020204030204" pitchFamily="34" charset="0"/>
+                      </a:endParaRPr>
+                    </a:p>
+                  </a:txBody>
+                  <a:tcPr marL="0" marR="0" marT="0" marB="0" anchor="ctr"/>
+                </a:tc>
+                <a:tc>
+                  <a:txBody>
+                    <a:bodyPr/>
+                    <a:lstStyle/>
+                    <a:p>
+                      <a:pPr algn="l" fontAlgn="t"/>
+                      <a:r>
+                        <a:rPr lang="es-ES" sz="700" u="none" strike="noStrike">
+                          <a:effectLst/>
+                        </a:rPr>
+                        <a:t>Si no se tiene el personal para la entrega del servicio calificado, la entrega del  podrían ser deficientes y no se lograría una entrega de calidad</a:t>
+                      </a:r>
+                      <a:endParaRPr lang="es-ES" sz="700" b="0" i="0" u="none" strike="noStrike">
+                        <a:solidFill>
+                          <a:srgbClr val="000000"/>
+                        </a:solidFill>
+                        <a:effectLst/>
+                        <a:latin typeface="Calibri" panose="020F0502020204030204" pitchFamily="34" charset="0"/>
+                      </a:endParaRPr>
+                    </a:p>
+                  </a:txBody>
+                  <a:tcPr marL="0" marR="0" marT="0" marB="0"/>
+                </a:tc>
+                <a:tc>
+                  <a:txBody>
+                    <a:bodyPr/>
+                    <a:lstStyle/>
+                    <a:p>
+                      <a:pPr algn="ctr" fontAlgn="ctr"/>
+                      <a:r>
+                        <a:rPr lang="es-MX" sz="700" u="none" strike="noStrike">
+                          <a:effectLst/>
+                        </a:rPr>
+                        <a:t>5</a:t>
+                      </a:r>
+                      <a:endParaRPr lang="es-MX" sz="700" b="0" i="0" u="none" strike="noStrike">
+                        <a:solidFill>
+                          <a:srgbClr val="000000"/>
+                        </a:solidFill>
+                        <a:effectLst/>
+                        <a:latin typeface="Calibri" panose="020F0502020204030204" pitchFamily="34" charset="0"/>
+                      </a:endParaRPr>
+                    </a:p>
+                  </a:txBody>
+                  <a:tcPr marL="0" marR="0" marT="0" marB="0" anchor="ctr"/>
+                </a:tc>
+                <a:tc>
+                  <a:txBody>
+                    <a:bodyPr/>
+                    <a:lstStyle/>
+                    <a:p>
+                      <a:pPr algn="ctr" fontAlgn="ctr"/>
+                      <a:r>
+                        <a:rPr lang="es-MX" sz="700" u="none" strike="noStrike">
+                          <a:effectLst/>
+                        </a:rPr>
+                        <a:t>30%</a:t>
+                      </a:r>
+                      <a:endParaRPr lang="es-MX" sz="700" b="0" i="0" u="none" strike="noStrike">
+                        <a:solidFill>
+                          <a:srgbClr val="000000"/>
+                        </a:solidFill>
+                        <a:effectLst/>
+                        <a:latin typeface="Calibri" panose="020F0502020204030204" pitchFamily="34" charset="0"/>
+                      </a:endParaRPr>
+                    </a:p>
+                  </a:txBody>
+                  <a:tcPr marL="0" marR="0" marT="0" marB="0" anchor="ctr"/>
+                </a:tc>
+                <a:tc>
+                  <a:txBody>
+                    <a:bodyPr/>
+                    <a:lstStyle/>
+                    <a:p>
+                      <a:pPr algn="ctr" fontAlgn="ctr"/>
+                      <a:r>
+                        <a:rPr lang="es-MX" sz="700" u="none" strike="noStrike">
+                          <a:effectLst/>
+                        </a:rPr>
+                        <a:t>1,5</a:t>
+                      </a:r>
+                      <a:endParaRPr lang="es-MX" sz="700" b="0" i="0" u="none" strike="noStrike">
+                        <a:solidFill>
+                          <a:srgbClr val="000000"/>
+                        </a:solidFill>
+                        <a:effectLst/>
+                        <a:latin typeface="Calibri" panose="020F0502020204030204" pitchFamily="34" charset="0"/>
+                      </a:endParaRPr>
+                    </a:p>
+                  </a:txBody>
+                  <a:tcPr marL="0" marR="0" marT="0" marB="0" anchor="ctr"/>
+                </a:tc>
+                <a:tc>
+                  <a:txBody>
+                    <a:bodyPr/>
+                    <a:lstStyle/>
+                    <a:p>
+                      <a:pPr algn="ctr" fontAlgn="ctr"/>
+                      <a:r>
+                        <a:rPr lang="es-MX" sz="700" u="none" strike="noStrike">
+                          <a:effectLst/>
+                        </a:rPr>
+                        <a:t>1</a:t>
+                      </a:r>
+                      <a:endParaRPr lang="es-MX" sz="700" b="0" i="0" u="none" strike="noStrike">
+                        <a:solidFill>
+                          <a:srgbClr val="000000"/>
+                        </a:solidFill>
+                        <a:effectLst/>
+                        <a:latin typeface="Calibri" panose="020F0502020204030204" pitchFamily="34" charset="0"/>
+                      </a:endParaRPr>
+                    </a:p>
+                  </a:txBody>
+                  <a:tcPr marL="0" marR="0" marT="0" marB="0" anchor="ctr"/>
+                </a:tc>
+                <a:tc>
+                  <a:txBody>
+                    <a:bodyPr/>
+                    <a:lstStyle/>
+                    <a:p>
+                      <a:pPr algn="l" fontAlgn="ctr"/>
+                      <a:r>
+                        <a:rPr lang="es-ES" sz="700" u="none" strike="noStrike">
+                          <a:effectLst/>
+                        </a:rPr>
+                        <a:t>Generar un plan de capacitación para incrementar las habilidades del personal</a:t>
+                      </a:r>
+                      <a:endParaRPr lang="es-ES" sz="700" b="0" i="0" u="none" strike="noStrike">
+                        <a:solidFill>
+                          <a:srgbClr val="000000"/>
+                        </a:solidFill>
+                        <a:effectLst/>
+                        <a:latin typeface="Calibri" panose="020F0502020204030204" pitchFamily="34" charset="0"/>
+                      </a:endParaRPr>
+                    </a:p>
+                  </a:txBody>
+                  <a:tcPr marL="0" marR="0" marT="0" marB="0" anchor="ctr"/>
+                </a:tc>
+                <a:tc>
+                  <a:txBody>
+                    <a:bodyPr/>
+                    <a:lstStyle/>
+                    <a:p>
+                      <a:pPr algn="l" fontAlgn="ctr"/>
+                      <a:r>
+                        <a:rPr lang="es-ES" sz="700" u="none" strike="noStrike">
+                          <a:effectLst/>
+                        </a:rPr>
+                        <a:t>Contratar personal experto en los servicios que ofrece la empresa</a:t>
+                      </a:r>
+                      <a:endParaRPr lang="es-ES" sz="700" b="0" i="0" u="none" strike="noStrike">
+                        <a:solidFill>
+                          <a:srgbClr val="000000"/>
+                        </a:solidFill>
+                        <a:effectLst/>
+                        <a:latin typeface="Calibri" panose="020F0502020204030204" pitchFamily="34" charset="0"/>
+                      </a:endParaRPr>
+                    </a:p>
+                  </a:txBody>
+                  <a:tcPr marL="0" marR="0" marT="0" marB="0" anchor="ctr"/>
+                </a:tc>
+                <a:tc>
+                  <a:txBody>
+                    <a:bodyPr/>
+                    <a:lstStyle/>
+                    <a:p>
+                      <a:pPr algn="ctr" fontAlgn="ctr"/>
+                      <a:r>
+                        <a:rPr lang="es-MX" sz="700" u="none" strike="noStrike">
+                          <a:effectLst/>
+                        </a:rPr>
+                        <a:t>Jovanny Zepeda</a:t>
+                      </a:r>
+                      <a:endParaRPr lang="es-MX" sz="700" b="0" i="0" u="none" strike="noStrike">
+                        <a:solidFill>
+                          <a:srgbClr val="000000"/>
+                        </a:solidFill>
+                        <a:effectLst/>
+                        <a:latin typeface="Calibri" panose="020F0502020204030204" pitchFamily="34" charset="0"/>
+                      </a:endParaRPr>
+                    </a:p>
+                  </a:txBody>
+                  <a:tcPr marL="0" marR="0" marT="0" marB="0" anchor="ctr"/>
+                </a:tc>
+                <a:tc>
+                  <a:txBody>
+                    <a:bodyPr/>
+                    <a:lstStyle/>
+                    <a:p>
+                      <a:pPr algn="ctr" fontAlgn="ctr"/>
+                      <a:r>
+                        <a:rPr lang="es-MX" sz="700" u="none" strike="noStrike">
+                          <a:effectLst/>
+                        </a:rPr>
+                        <a:t>Mitigado</a:t>
+                      </a:r>
+                      <a:endParaRPr lang="es-MX" sz="700" b="0" i="0" u="none" strike="noStrike">
+                        <a:solidFill>
+                          <a:srgbClr val="000000"/>
+                        </a:solidFill>
+                        <a:effectLst/>
+                        <a:latin typeface="Calibri" panose="020F0502020204030204" pitchFamily="34" charset="0"/>
+                      </a:endParaRPr>
+                    </a:p>
+                  </a:txBody>
+                  <a:tcPr marL="0" marR="0" marT="0" marB="0" anchor="ctr"/>
+                </a:tc>
+              </a:tr>
+              <a:tr h="389934">
+                <a:tc>
+                  <a:txBody>
+                    <a:bodyPr/>
+                    <a:lstStyle/>
+                    <a:p>
+                      <a:pPr algn="ctr" fontAlgn="ctr"/>
+                      <a:r>
+                        <a:rPr lang="es-MX" sz="700" u="none" strike="noStrike">
+                          <a:effectLst/>
+                        </a:rPr>
+                        <a:t>3</a:t>
+                      </a:r>
+                      <a:endParaRPr lang="es-MX" sz="700" b="0" i="0" u="none" strike="noStrike">
+                        <a:solidFill>
+                          <a:srgbClr val="000000"/>
+                        </a:solidFill>
+                        <a:effectLst/>
+                        <a:latin typeface="Calibri" panose="020F0502020204030204" pitchFamily="34" charset="0"/>
+                      </a:endParaRPr>
+                    </a:p>
+                  </a:txBody>
+                  <a:tcPr marL="0" marR="0" marT="0" marB="0" anchor="ctr"/>
+                </a:tc>
+                <a:tc>
+                  <a:txBody>
+                    <a:bodyPr/>
+                    <a:lstStyle/>
+                    <a:p>
+                      <a:pPr algn="l" fontAlgn="t"/>
+                      <a:r>
+                        <a:rPr lang="es-ES" sz="700" u="none" strike="noStrike">
+                          <a:effectLst/>
+                        </a:rPr>
+                        <a:t>Perdida de Servidor por falla en el equipo o siniestro natural</a:t>
+                      </a:r>
+                      <a:endParaRPr lang="es-ES" sz="700" b="0" i="0" u="none" strike="noStrike">
+                        <a:solidFill>
+                          <a:srgbClr val="000000"/>
+                        </a:solidFill>
+                        <a:effectLst/>
+                        <a:latin typeface="Calibri" panose="020F0502020204030204" pitchFamily="34" charset="0"/>
+                      </a:endParaRPr>
+                    </a:p>
+                  </a:txBody>
+                  <a:tcPr marL="0" marR="0" marT="0" marB="0"/>
+                </a:tc>
+                <a:tc>
+                  <a:txBody>
+                    <a:bodyPr/>
+                    <a:lstStyle/>
+                    <a:p>
+                      <a:pPr algn="ctr" fontAlgn="ctr"/>
+                      <a:r>
+                        <a:rPr lang="es-MX" sz="700" u="none" strike="noStrike">
+                          <a:effectLst/>
+                        </a:rPr>
+                        <a:t>5</a:t>
+                      </a:r>
+                      <a:endParaRPr lang="es-MX" sz="700" b="0" i="0" u="none" strike="noStrike">
+                        <a:solidFill>
+                          <a:srgbClr val="000000"/>
+                        </a:solidFill>
+                        <a:effectLst/>
+                        <a:latin typeface="Calibri" panose="020F0502020204030204" pitchFamily="34" charset="0"/>
+                      </a:endParaRPr>
+                    </a:p>
+                  </a:txBody>
+                  <a:tcPr marL="0" marR="0" marT="0" marB="0" anchor="ctr"/>
+                </a:tc>
+                <a:tc>
+                  <a:txBody>
+                    <a:bodyPr/>
+                    <a:lstStyle/>
+                    <a:p>
+                      <a:pPr algn="ctr" fontAlgn="ctr"/>
+                      <a:r>
+                        <a:rPr lang="es-MX" sz="700" u="none" strike="noStrike">
+                          <a:effectLst/>
+                        </a:rPr>
+                        <a:t>20%</a:t>
+                      </a:r>
+                      <a:endParaRPr lang="es-MX" sz="700" b="0" i="0" u="none" strike="noStrike">
+                        <a:solidFill>
+                          <a:srgbClr val="000000"/>
+                        </a:solidFill>
+                        <a:effectLst/>
+                        <a:latin typeface="Calibri" panose="020F0502020204030204" pitchFamily="34" charset="0"/>
+                      </a:endParaRPr>
+                    </a:p>
+                  </a:txBody>
+                  <a:tcPr marL="0" marR="0" marT="0" marB="0" anchor="ctr"/>
+                </a:tc>
+                <a:tc>
+                  <a:txBody>
+                    <a:bodyPr/>
+                    <a:lstStyle/>
+                    <a:p>
+                      <a:pPr algn="ctr" fontAlgn="ctr"/>
+                      <a:r>
+                        <a:rPr lang="es-MX" sz="700" u="none" strike="noStrike">
+                          <a:effectLst/>
+                        </a:rPr>
+                        <a:t>1</a:t>
+                      </a:r>
+                      <a:endParaRPr lang="es-MX" sz="700" b="0" i="0" u="none" strike="noStrike">
+                        <a:solidFill>
+                          <a:srgbClr val="000000"/>
+                        </a:solidFill>
+                        <a:effectLst/>
+                        <a:latin typeface="Calibri" panose="020F0502020204030204" pitchFamily="34" charset="0"/>
+                      </a:endParaRPr>
+                    </a:p>
+                  </a:txBody>
+                  <a:tcPr marL="0" marR="0" marT="0" marB="0" anchor="ctr"/>
+                </a:tc>
+                <a:tc>
+                  <a:txBody>
+                    <a:bodyPr/>
+                    <a:lstStyle/>
+                    <a:p>
+                      <a:pPr algn="ctr" fontAlgn="ctr"/>
+                      <a:r>
+                        <a:rPr lang="es-MX" sz="700" u="none" strike="noStrike">
+                          <a:effectLst/>
+                        </a:rPr>
+                        <a:t>1</a:t>
+                      </a:r>
+                      <a:endParaRPr lang="es-MX" sz="700" b="0" i="0" u="none" strike="noStrike">
+                        <a:solidFill>
+                          <a:srgbClr val="000000"/>
+                        </a:solidFill>
+                        <a:effectLst/>
+                        <a:latin typeface="Calibri" panose="020F0502020204030204" pitchFamily="34" charset="0"/>
+                      </a:endParaRPr>
+                    </a:p>
+                  </a:txBody>
+                  <a:tcPr marL="0" marR="0" marT="0" marB="0" anchor="ctr"/>
+                </a:tc>
+                <a:tc>
+                  <a:txBody>
+                    <a:bodyPr/>
+                    <a:lstStyle/>
+                    <a:p>
+                      <a:pPr algn="l" fontAlgn="t"/>
+                      <a:r>
+                        <a:rPr lang="es-ES" sz="700" u="none" strike="noStrike">
+                          <a:effectLst/>
+                        </a:rPr>
+                        <a:t>Generar respaldos preventivos con toda la informacion en un lugar diferente al ordenador </a:t>
+                      </a:r>
+                      <a:endParaRPr lang="es-ES" sz="700" b="0" i="0" u="none" strike="noStrike">
+                        <a:solidFill>
+                          <a:srgbClr val="000000"/>
+                        </a:solidFill>
+                        <a:effectLst/>
+                        <a:latin typeface="Calibri" panose="020F0502020204030204" pitchFamily="34" charset="0"/>
+                      </a:endParaRPr>
+                    </a:p>
+                  </a:txBody>
+                  <a:tcPr marL="0" marR="0" marT="0" marB="0"/>
+                </a:tc>
+                <a:tc>
+                  <a:txBody>
+                    <a:bodyPr/>
+                    <a:lstStyle/>
+                    <a:p>
+                      <a:pPr algn="l" fontAlgn="t"/>
+                      <a:r>
+                        <a:rPr lang="es-ES" sz="700" u="none" strike="noStrike">
+                          <a:effectLst/>
+                        </a:rPr>
+                        <a:t>Reinstalar servicio en un servidor distinto</a:t>
+                      </a:r>
+                      <a:endParaRPr lang="es-ES" sz="700" b="0" i="0" u="none" strike="noStrike">
+                        <a:solidFill>
+                          <a:srgbClr val="000000"/>
+                        </a:solidFill>
+                        <a:effectLst/>
+                        <a:latin typeface="Calibri" panose="020F0502020204030204" pitchFamily="34" charset="0"/>
+                      </a:endParaRPr>
+                    </a:p>
+                  </a:txBody>
+                  <a:tcPr marL="0" marR="0" marT="0" marB="0"/>
+                </a:tc>
+                <a:tc>
+                  <a:txBody>
+                    <a:bodyPr/>
+                    <a:lstStyle/>
+                    <a:p>
+                      <a:pPr algn="ctr" fontAlgn="ctr"/>
+                      <a:r>
+                        <a:rPr lang="es-MX" sz="700" u="none" strike="noStrike">
+                          <a:effectLst/>
+                        </a:rPr>
+                        <a:t>Jovanny Zepeda</a:t>
+                      </a:r>
+                      <a:endParaRPr lang="es-MX" sz="700" b="0" i="0" u="none" strike="noStrike">
+                        <a:solidFill>
+                          <a:srgbClr val="000000"/>
+                        </a:solidFill>
+                        <a:effectLst/>
+                        <a:latin typeface="Calibri" panose="020F0502020204030204" pitchFamily="34" charset="0"/>
+                      </a:endParaRPr>
+                    </a:p>
+                  </a:txBody>
+                  <a:tcPr marL="0" marR="0" marT="0" marB="0" anchor="ctr"/>
+                </a:tc>
+                <a:tc>
+                  <a:txBody>
+                    <a:bodyPr/>
+                    <a:lstStyle/>
+                    <a:p>
+                      <a:pPr algn="ctr" fontAlgn="ctr"/>
+                      <a:r>
+                        <a:rPr lang="es-MX" sz="700" u="none" strike="noStrike">
+                          <a:effectLst/>
+                        </a:rPr>
+                        <a:t>Mitigado</a:t>
+                      </a:r>
+                      <a:endParaRPr lang="es-MX" sz="700" b="0" i="0" u="none" strike="noStrike">
+                        <a:solidFill>
+                          <a:srgbClr val="000000"/>
+                        </a:solidFill>
+                        <a:effectLst/>
+                        <a:latin typeface="Calibri" panose="020F0502020204030204" pitchFamily="34" charset="0"/>
+                      </a:endParaRPr>
+                    </a:p>
+                  </a:txBody>
+                  <a:tcPr marL="0" marR="0" marT="0" marB="0" anchor="ctr"/>
+                </a:tc>
+              </a:tr>
+              <a:tr h="389934">
+                <a:tc>
+                  <a:txBody>
+                    <a:bodyPr/>
+                    <a:lstStyle/>
+                    <a:p>
+                      <a:pPr algn="ctr" fontAlgn="ctr"/>
+                      <a:r>
+                        <a:rPr lang="es-MX" sz="700" u="none" strike="noStrike">
+                          <a:effectLst/>
+                        </a:rPr>
+                        <a:t>4</a:t>
+                      </a:r>
+                      <a:endParaRPr lang="es-MX" sz="700" b="0" i="0" u="none" strike="noStrike">
+                        <a:solidFill>
+                          <a:srgbClr val="000000"/>
+                        </a:solidFill>
+                        <a:effectLst/>
+                        <a:latin typeface="Calibri" panose="020F0502020204030204" pitchFamily="34" charset="0"/>
+                      </a:endParaRPr>
+                    </a:p>
+                  </a:txBody>
+                  <a:tcPr marL="0" marR="0" marT="0" marB="0" anchor="ctr"/>
+                </a:tc>
+                <a:tc>
+                  <a:txBody>
+                    <a:bodyPr/>
+                    <a:lstStyle/>
+                    <a:p>
+                      <a:pPr algn="l" fontAlgn="t"/>
+                      <a:r>
+                        <a:rPr lang="es-ES" sz="700" u="none" strike="noStrike">
+                          <a:effectLst/>
+                        </a:rPr>
+                        <a:t>Desviaciones elevadas a causa de pocos clientes</a:t>
+                      </a:r>
+                      <a:endParaRPr lang="es-ES" sz="700" b="0" i="0" u="none" strike="noStrike">
+                        <a:solidFill>
+                          <a:srgbClr val="000000"/>
+                        </a:solidFill>
+                        <a:effectLst/>
+                        <a:latin typeface="Calibri" panose="020F0502020204030204" pitchFamily="34" charset="0"/>
+                      </a:endParaRPr>
+                    </a:p>
+                  </a:txBody>
+                  <a:tcPr marL="0" marR="0" marT="0" marB="0"/>
+                </a:tc>
+                <a:tc>
+                  <a:txBody>
+                    <a:bodyPr/>
+                    <a:lstStyle/>
+                    <a:p>
+                      <a:pPr algn="ctr" fontAlgn="ctr"/>
+                      <a:r>
+                        <a:rPr lang="es-MX" sz="700" u="none" strike="noStrike">
+                          <a:effectLst/>
+                        </a:rPr>
+                        <a:t>2</a:t>
+                      </a:r>
+                      <a:endParaRPr lang="es-MX" sz="700" b="0" i="0" u="none" strike="noStrike">
+                        <a:solidFill>
+                          <a:srgbClr val="000000"/>
+                        </a:solidFill>
+                        <a:effectLst/>
+                        <a:latin typeface="Calibri" panose="020F0502020204030204" pitchFamily="34" charset="0"/>
+                      </a:endParaRPr>
+                    </a:p>
+                  </a:txBody>
+                  <a:tcPr marL="0" marR="0" marT="0" marB="0" anchor="ctr"/>
+                </a:tc>
+                <a:tc>
+                  <a:txBody>
+                    <a:bodyPr/>
+                    <a:lstStyle/>
+                    <a:p>
+                      <a:pPr algn="ctr" fontAlgn="ctr"/>
+                      <a:r>
+                        <a:rPr lang="es-MX" sz="700" u="none" strike="noStrike">
+                          <a:effectLst/>
+                        </a:rPr>
+                        <a:t>65%</a:t>
+                      </a:r>
+                      <a:endParaRPr lang="es-MX" sz="700" b="0" i="0" u="none" strike="noStrike">
+                        <a:solidFill>
+                          <a:srgbClr val="000000"/>
+                        </a:solidFill>
+                        <a:effectLst/>
+                        <a:latin typeface="Calibri" panose="020F0502020204030204" pitchFamily="34" charset="0"/>
+                      </a:endParaRPr>
+                    </a:p>
+                  </a:txBody>
+                  <a:tcPr marL="0" marR="0" marT="0" marB="0" anchor="ctr"/>
+                </a:tc>
+                <a:tc>
+                  <a:txBody>
+                    <a:bodyPr/>
+                    <a:lstStyle/>
+                    <a:p>
+                      <a:pPr algn="ctr" fontAlgn="ctr"/>
+                      <a:r>
+                        <a:rPr lang="es-MX" sz="700" u="none" strike="noStrike">
+                          <a:effectLst/>
+                        </a:rPr>
+                        <a:t>1,3</a:t>
+                      </a:r>
+                      <a:endParaRPr lang="es-MX" sz="700" b="0" i="0" u="none" strike="noStrike">
+                        <a:solidFill>
+                          <a:srgbClr val="000000"/>
+                        </a:solidFill>
+                        <a:effectLst/>
+                        <a:latin typeface="Calibri" panose="020F0502020204030204" pitchFamily="34" charset="0"/>
+                      </a:endParaRPr>
+                    </a:p>
+                  </a:txBody>
+                  <a:tcPr marL="0" marR="0" marT="0" marB="0" anchor="ctr"/>
+                </a:tc>
+                <a:tc>
+                  <a:txBody>
+                    <a:bodyPr/>
+                    <a:lstStyle/>
+                    <a:p>
+                      <a:pPr algn="ctr" fontAlgn="ctr"/>
+                      <a:r>
+                        <a:rPr lang="es-MX" sz="700" u="none" strike="noStrike">
+                          <a:effectLst/>
+                        </a:rPr>
+                        <a:t>3</a:t>
+                      </a:r>
+                      <a:endParaRPr lang="es-MX" sz="700" b="0" i="0" u="none" strike="noStrike">
+                        <a:solidFill>
+                          <a:srgbClr val="000000"/>
+                        </a:solidFill>
+                        <a:effectLst/>
+                        <a:latin typeface="Calibri" panose="020F0502020204030204" pitchFamily="34" charset="0"/>
+                      </a:endParaRPr>
+                    </a:p>
+                  </a:txBody>
+                  <a:tcPr marL="0" marR="0" marT="0" marB="0" anchor="ctr"/>
+                </a:tc>
+                <a:tc>
+                  <a:txBody>
+                    <a:bodyPr/>
+                    <a:lstStyle/>
+                    <a:p>
+                      <a:pPr algn="l" fontAlgn="t"/>
+                      <a:r>
+                        <a:rPr lang="es-ES" sz="700" u="none" strike="noStrike">
+                          <a:effectLst/>
+                        </a:rPr>
+                        <a:t>Generar servicio adecuado para que los clientes comiencen a recomendar los servicios otorgados</a:t>
+                      </a:r>
+                      <a:endParaRPr lang="es-ES" sz="700" b="0" i="0" u="none" strike="noStrike">
+                        <a:solidFill>
+                          <a:srgbClr val="000000"/>
+                        </a:solidFill>
+                        <a:effectLst/>
+                        <a:latin typeface="Calibri" panose="020F0502020204030204" pitchFamily="34" charset="0"/>
+                      </a:endParaRPr>
+                    </a:p>
+                  </a:txBody>
+                  <a:tcPr marL="0" marR="0" marT="0" marB="0"/>
+                </a:tc>
+                <a:tc>
+                  <a:txBody>
+                    <a:bodyPr/>
+                    <a:lstStyle/>
+                    <a:p>
+                      <a:pPr algn="l" fontAlgn="t"/>
+                      <a:r>
+                        <a:rPr lang="es-ES" sz="700" u="none" strike="noStrike">
+                          <a:effectLst/>
+                        </a:rPr>
+                        <a:t>Buscar mas clientes para poder invertir mas tiempo del planeado en la ejecucion</a:t>
+                      </a:r>
+                      <a:endParaRPr lang="es-ES" sz="700" b="0" i="0" u="none" strike="noStrike">
+                        <a:solidFill>
+                          <a:srgbClr val="000000"/>
+                        </a:solidFill>
+                        <a:effectLst/>
+                        <a:latin typeface="Calibri" panose="020F0502020204030204" pitchFamily="34" charset="0"/>
+                      </a:endParaRPr>
+                    </a:p>
+                  </a:txBody>
+                  <a:tcPr marL="0" marR="0" marT="0" marB="0"/>
+                </a:tc>
+                <a:tc>
+                  <a:txBody>
+                    <a:bodyPr/>
+                    <a:lstStyle/>
+                    <a:p>
+                      <a:pPr algn="ctr" fontAlgn="ctr"/>
+                      <a:r>
+                        <a:rPr lang="es-MX" sz="700" u="none" strike="noStrike">
+                          <a:effectLst/>
+                        </a:rPr>
+                        <a:t>Fidel Reyna</a:t>
+                      </a:r>
+                      <a:endParaRPr lang="es-MX" sz="700" b="0" i="0" u="none" strike="noStrike">
+                        <a:solidFill>
+                          <a:srgbClr val="000000"/>
+                        </a:solidFill>
+                        <a:effectLst/>
+                        <a:latin typeface="Calibri" panose="020F0502020204030204" pitchFamily="34" charset="0"/>
+                      </a:endParaRPr>
+                    </a:p>
+                  </a:txBody>
+                  <a:tcPr marL="0" marR="0" marT="0" marB="0" anchor="ctr"/>
+                </a:tc>
+                <a:tc>
+                  <a:txBody>
+                    <a:bodyPr/>
+                    <a:lstStyle/>
+                    <a:p>
+                      <a:pPr algn="ctr" fontAlgn="ctr"/>
+                      <a:r>
+                        <a:rPr lang="es-MX" sz="700" u="none" strike="noStrike">
+                          <a:effectLst/>
+                        </a:rPr>
+                        <a:t>Ocurrido</a:t>
+                      </a:r>
+                      <a:endParaRPr lang="es-MX" sz="700" b="0" i="0" u="none" strike="noStrike">
+                        <a:solidFill>
+                          <a:srgbClr val="000000"/>
+                        </a:solidFill>
+                        <a:effectLst/>
+                        <a:latin typeface="Calibri" panose="020F0502020204030204" pitchFamily="34" charset="0"/>
+                      </a:endParaRPr>
+                    </a:p>
+                  </a:txBody>
+                  <a:tcPr marL="0" marR="0" marT="0" marB="0" anchor="ctr"/>
+                </a:tc>
+              </a:tr>
+              <a:tr h="649890">
+                <a:tc>
+                  <a:txBody>
+                    <a:bodyPr/>
+                    <a:lstStyle/>
+                    <a:p>
+                      <a:pPr algn="ctr" fontAlgn="ctr"/>
+                      <a:r>
+                        <a:rPr lang="es-MX" sz="700" u="none" strike="noStrike">
+                          <a:effectLst/>
+                        </a:rPr>
+                        <a:t>5</a:t>
+                      </a:r>
+                      <a:endParaRPr lang="es-MX" sz="700" b="0" i="0" u="none" strike="noStrike">
+                        <a:solidFill>
+                          <a:srgbClr val="000000"/>
+                        </a:solidFill>
+                        <a:effectLst/>
+                        <a:latin typeface="Calibri" panose="020F0502020204030204" pitchFamily="34" charset="0"/>
+                      </a:endParaRPr>
+                    </a:p>
+                  </a:txBody>
+                  <a:tcPr marL="0" marR="0" marT="0" marB="0" anchor="ctr"/>
+                </a:tc>
+                <a:tc>
+                  <a:txBody>
+                    <a:bodyPr/>
+                    <a:lstStyle/>
+                    <a:p>
+                      <a:pPr algn="l" fontAlgn="t"/>
+                      <a:r>
+                        <a:rPr lang="es-ES" sz="700" u="none" strike="noStrike">
+                          <a:effectLst/>
+                        </a:rPr>
+                        <a:t>Debido a que el servicio web en ocasiones es inestable existe la probabilidad de que el sistema utilizado de tickets sea inaccesible por algunos momentos</a:t>
+                      </a:r>
+                      <a:endParaRPr lang="es-ES" sz="700" b="0" i="0" u="none" strike="noStrike">
+                        <a:solidFill>
+                          <a:srgbClr val="000000"/>
+                        </a:solidFill>
+                        <a:effectLst/>
+                        <a:latin typeface="Calibri" panose="020F0502020204030204" pitchFamily="34" charset="0"/>
+                      </a:endParaRPr>
+                    </a:p>
+                  </a:txBody>
+                  <a:tcPr marL="0" marR="0" marT="0" marB="0"/>
+                </a:tc>
+                <a:tc>
+                  <a:txBody>
+                    <a:bodyPr/>
+                    <a:lstStyle/>
+                    <a:p>
+                      <a:pPr algn="ctr" fontAlgn="ctr"/>
+                      <a:r>
+                        <a:rPr lang="es-MX" sz="700" u="none" strike="noStrike">
+                          <a:effectLst/>
+                        </a:rPr>
+                        <a:t>2</a:t>
+                      </a:r>
+                      <a:endParaRPr lang="es-MX" sz="700" b="0" i="0" u="none" strike="noStrike">
+                        <a:solidFill>
+                          <a:srgbClr val="000000"/>
+                        </a:solidFill>
+                        <a:effectLst/>
+                        <a:latin typeface="Calibri" panose="020F0502020204030204" pitchFamily="34" charset="0"/>
+                      </a:endParaRPr>
+                    </a:p>
+                  </a:txBody>
+                  <a:tcPr marL="0" marR="0" marT="0" marB="0" anchor="ctr"/>
+                </a:tc>
+                <a:tc>
+                  <a:txBody>
+                    <a:bodyPr/>
+                    <a:lstStyle/>
+                    <a:p>
+                      <a:pPr algn="ctr" fontAlgn="ctr"/>
+                      <a:r>
+                        <a:rPr lang="es-MX" sz="700" u="none" strike="noStrike">
+                          <a:effectLst/>
+                        </a:rPr>
+                        <a:t>45%</a:t>
+                      </a:r>
+                      <a:endParaRPr lang="es-MX" sz="700" b="0" i="0" u="none" strike="noStrike">
+                        <a:solidFill>
+                          <a:srgbClr val="000000"/>
+                        </a:solidFill>
+                        <a:effectLst/>
+                        <a:latin typeface="Calibri" panose="020F0502020204030204" pitchFamily="34" charset="0"/>
+                      </a:endParaRPr>
+                    </a:p>
+                  </a:txBody>
+                  <a:tcPr marL="0" marR="0" marT="0" marB="0" anchor="ctr"/>
+                </a:tc>
+                <a:tc>
+                  <a:txBody>
+                    <a:bodyPr/>
+                    <a:lstStyle/>
+                    <a:p>
+                      <a:pPr algn="ctr" fontAlgn="ctr"/>
+                      <a:r>
+                        <a:rPr lang="es-MX" sz="700" u="none" strike="noStrike">
+                          <a:effectLst/>
+                        </a:rPr>
+                        <a:t>0,9</a:t>
+                      </a:r>
+                      <a:endParaRPr lang="es-MX" sz="700" b="0" i="0" u="none" strike="noStrike">
+                        <a:solidFill>
+                          <a:srgbClr val="000000"/>
+                        </a:solidFill>
+                        <a:effectLst/>
+                        <a:latin typeface="Calibri" panose="020F0502020204030204" pitchFamily="34" charset="0"/>
+                      </a:endParaRPr>
+                    </a:p>
+                  </a:txBody>
+                  <a:tcPr marL="0" marR="0" marT="0" marB="0" anchor="ctr"/>
+                </a:tc>
+                <a:tc>
+                  <a:txBody>
+                    <a:bodyPr/>
+                    <a:lstStyle/>
+                    <a:p>
+                      <a:pPr algn="ctr" fontAlgn="ctr"/>
+                      <a:r>
+                        <a:rPr lang="es-MX" sz="700" u="none" strike="noStrike">
+                          <a:effectLst/>
+                        </a:rPr>
+                        <a:t>2</a:t>
+                      </a:r>
+                      <a:endParaRPr lang="es-MX" sz="700" b="0" i="0" u="none" strike="noStrike">
+                        <a:solidFill>
+                          <a:srgbClr val="000000"/>
+                        </a:solidFill>
+                        <a:effectLst/>
+                        <a:latin typeface="Calibri" panose="020F0502020204030204" pitchFamily="34" charset="0"/>
+                      </a:endParaRPr>
+                    </a:p>
+                  </a:txBody>
+                  <a:tcPr marL="0" marR="0" marT="0" marB="0" anchor="ctr"/>
+                </a:tc>
+                <a:tc>
+                  <a:txBody>
+                    <a:bodyPr/>
+                    <a:lstStyle/>
+                    <a:p>
+                      <a:pPr algn="l" fontAlgn="t"/>
+                      <a:r>
+                        <a:rPr lang="es-ES" sz="700" u="none" strike="noStrike">
+                          <a:effectLst/>
+                        </a:rPr>
+                        <a:t>Generar limpiezas y mantenimintos adecuados al servicio HTTP del servidor para evitar fallas</a:t>
+                      </a:r>
+                      <a:endParaRPr lang="es-ES" sz="700" b="0" i="0" u="none" strike="noStrike">
+                        <a:solidFill>
+                          <a:srgbClr val="000000"/>
+                        </a:solidFill>
+                        <a:effectLst/>
+                        <a:latin typeface="Calibri" panose="020F0502020204030204" pitchFamily="34" charset="0"/>
+                      </a:endParaRPr>
+                    </a:p>
+                  </a:txBody>
+                  <a:tcPr marL="0" marR="0" marT="0" marB="0"/>
+                </a:tc>
+                <a:tc>
+                  <a:txBody>
+                    <a:bodyPr/>
+                    <a:lstStyle/>
+                    <a:p>
+                      <a:pPr algn="l" fontAlgn="t"/>
+                      <a:r>
+                        <a:rPr lang="es-ES" sz="700" u="none" strike="noStrike">
+                          <a:effectLst/>
+                        </a:rPr>
+                        <a:t>Generar registro temporal en herramientas secundarias y en caso de falla total migrar la informacion a la herramienta vtigger</a:t>
+                      </a:r>
+                      <a:endParaRPr lang="es-ES" sz="700" b="0" i="0" u="none" strike="noStrike">
+                        <a:solidFill>
+                          <a:srgbClr val="000000"/>
+                        </a:solidFill>
+                        <a:effectLst/>
+                        <a:latin typeface="Calibri" panose="020F0502020204030204" pitchFamily="34" charset="0"/>
+                      </a:endParaRPr>
+                    </a:p>
+                  </a:txBody>
+                  <a:tcPr marL="0" marR="0" marT="0" marB="0"/>
+                </a:tc>
+                <a:tc>
+                  <a:txBody>
+                    <a:bodyPr/>
+                    <a:lstStyle/>
+                    <a:p>
+                      <a:pPr algn="ctr" fontAlgn="ctr"/>
+                      <a:r>
+                        <a:rPr lang="es-MX" sz="700" u="none" strike="noStrike">
+                          <a:effectLst/>
+                        </a:rPr>
+                        <a:t>Jovanny Zepeda</a:t>
+                      </a:r>
+                      <a:endParaRPr lang="es-MX" sz="700" b="0" i="0" u="none" strike="noStrike">
+                        <a:solidFill>
+                          <a:srgbClr val="000000"/>
+                        </a:solidFill>
+                        <a:effectLst/>
+                        <a:latin typeface="Calibri" panose="020F0502020204030204" pitchFamily="34" charset="0"/>
+                      </a:endParaRPr>
+                    </a:p>
+                  </a:txBody>
+                  <a:tcPr marL="0" marR="0" marT="0" marB="0" anchor="ctr"/>
+                </a:tc>
+                <a:tc>
+                  <a:txBody>
+                    <a:bodyPr/>
+                    <a:lstStyle/>
+                    <a:p>
+                      <a:pPr algn="ctr" fontAlgn="ctr"/>
+                      <a:r>
+                        <a:rPr lang="es-MX" sz="700" u="none" strike="noStrike">
+                          <a:effectLst/>
+                        </a:rPr>
+                        <a:t>Mitigado</a:t>
+                      </a:r>
+                      <a:endParaRPr lang="es-MX" sz="700" b="0" i="0" u="none" strike="noStrike">
+                        <a:solidFill>
+                          <a:srgbClr val="000000"/>
+                        </a:solidFill>
+                        <a:effectLst/>
+                        <a:latin typeface="Calibri" panose="020F0502020204030204" pitchFamily="34" charset="0"/>
+                      </a:endParaRPr>
+                    </a:p>
+                  </a:txBody>
+                  <a:tcPr marL="0" marR="0" marT="0" marB="0" anchor="ctr"/>
+                </a:tc>
+              </a:tr>
+              <a:tr h="519912">
+                <a:tc>
+                  <a:txBody>
+                    <a:bodyPr/>
+                    <a:lstStyle/>
+                    <a:p>
+                      <a:pPr algn="ctr" fontAlgn="ctr"/>
+                      <a:r>
+                        <a:rPr lang="es-MX" sz="700" u="none" strike="noStrike">
+                          <a:effectLst/>
+                        </a:rPr>
+                        <a:t>6</a:t>
+                      </a:r>
+                      <a:endParaRPr lang="es-MX" sz="700" b="0" i="0" u="none" strike="noStrike">
+                        <a:solidFill>
+                          <a:srgbClr val="000000"/>
+                        </a:solidFill>
+                        <a:effectLst/>
+                        <a:latin typeface="Calibri" panose="020F0502020204030204" pitchFamily="34" charset="0"/>
+                      </a:endParaRPr>
+                    </a:p>
+                  </a:txBody>
+                  <a:tcPr marL="0" marR="0" marT="0" marB="0" anchor="ctr"/>
+                </a:tc>
+                <a:tc>
+                  <a:txBody>
+                    <a:bodyPr/>
+                    <a:lstStyle/>
+                    <a:p>
+                      <a:pPr algn="l" fontAlgn="t"/>
+                      <a:r>
+                        <a:rPr lang="es-MX" sz="700" u="none" strike="noStrike">
+                          <a:effectLst/>
+                        </a:rPr>
+                        <a:t>Perdida o falta de integrantes del equipo basico de trabajo</a:t>
+                      </a:r>
+                      <a:endParaRPr lang="es-MX" sz="700" b="0" i="0" u="none" strike="noStrike">
+                        <a:solidFill>
+                          <a:srgbClr val="000000"/>
+                        </a:solidFill>
+                        <a:effectLst/>
+                        <a:latin typeface="Calibri" panose="020F0502020204030204" pitchFamily="34" charset="0"/>
+                      </a:endParaRPr>
+                    </a:p>
+                  </a:txBody>
+                  <a:tcPr marL="0" marR="0" marT="0" marB="0"/>
+                </a:tc>
+                <a:tc>
+                  <a:txBody>
+                    <a:bodyPr/>
+                    <a:lstStyle/>
+                    <a:p>
+                      <a:pPr algn="ctr" fontAlgn="ctr"/>
+                      <a:r>
+                        <a:rPr lang="es-MX" sz="700" u="none" strike="noStrike">
+                          <a:effectLst/>
+                        </a:rPr>
+                        <a:t>4</a:t>
+                      </a:r>
+                      <a:endParaRPr lang="es-MX" sz="700" b="0" i="0" u="none" strike="noStrike">
+                        <a:solidFill>
+                          <a:srgbClr val="000000"/>
+                        </a:solidFill>
+                        <a:effectLst/>
+                        <a:latin typeface="Calibri" panose="020F0502020204030204" pitchFamily="34" charset="0"/>
+                      </a:endParaRPr>
+                    </a:p>
+                  </a:txBody>
+                  <a:tcPr marL="0" marR="0" marT="0" marB="0" anchor="ctr"/>
+                </a:tc>
+                <a:tc>
+                  <a:txBody>
+                    <a:bodyPr/>
+                    <a:lstStyle/>
+                    <a:p>
+                      <a:pPr algn="ctr" fontAlgn="ctr"/>
+                      <a:r>
+                        <a:rPr lang="es-MX" sz="700" u="none" strike="noStrike">
+                          <a:effectLst/>
+                        </a:rPr>
+                        <a:t>55%</a:t>
+                      </a:r>
+                      <a:endParaRPr lang="es-MX" sz="700" b="0" i="0" u="none" strike="noStrike">
+                        <a:solidFill>
+                          <a:srgbClr val="000000"/>
+                        </a:solidFill>
+                        <a:effectLst/>
+                        <a:latin typeface="Calibri" panose="020F0502020204030204" pitchFamily="34" charset="0"/>
+                      </a:endParaRPr>
+                    </a:p>
+                  </a:txBody>
+                  <a:tcPr marL="0" marR="0" marT="0" marB="0" anchor="ctr"/>
+                </a:tc>
+                <a:tc>
+                  <a:txBody>
+                    <a:bodyPr/>
+                    <a:lstStyle/>
+                    <a:p>
+                      <a:pPr algn="ctr" fontAlgn="ctr"/>
+                      <a:r>
+                        <a:rPr lang="es-MX" sz="700" u="none" strike="noStrike">
+                          <a:effectLst/>
+                        </a:rPr>
+                        <a:t>2,2</a:t>
+                      </a:r>
+                      <a:endParaRPr lang="es-MX" sz="700" b="0" i="0" u="none" strike="noStrike">
+                        <a:solidFill>
+                          <a:srgbClr val="000000"/>
+                        </a:solidFill>
+                        <a:effectLst/>
+                        <a:latin typeface="Calibri" panose="020F0502020204030204" pitchFamily="34" charset="0"/>
+                      </a:endParaRPr>
+                    </a:p>
+                  </a:txBody>
+                  <a:tcPr marL="0" marR="0" marT="0" marB="0" anchor="ctr"/>
+                </a:tc>
+                <a:tc>
+                  <a:txBody>
+                    <a:bodyPr/>
+                    <a:lstStyle/>
+                    <a:p>
+                      <a:pPr algn="ctr" fontAlgn="ctr"/>
+                      <a:r>
+                        <a:rPr lang="es-MX" sz="700" u="none" strike="noStrike">
+                          <a:effectLst/>
+                        </a:rPr>
+                        <a:t>4</a:t>
+                      </a:r>
+                      <a:endParaRPr lang="es-MX" sz="700" b="0" i="0" u="none" strike="noStrike">
+                        <a:solidFill>
+                          <a:srgbClr val="000000"/>
+                        </a:solidFill>
+                        <a:effectLst/>
+                        <a:latin typeface="Calibri" panose="020F0502020204030204" pitchFamily="34" charset="0"/>
+                      </a:endParaRPr>
+                    </a:p>
+                  </a:txBody>
+                  <a:tcPr marL="0" marR="0" marT="0" marB="0" anchor="ctr"/>
+                </a:tc>
+                <a:tc>
+                  <a:txBody>
+                    <a:bodyPr/>
+                    <a:lstStyle/>
+                    <a:p>
+                      <a:pPr algn="l" fontAlgn="t"/>
+                      <a:r>
+                        <a:rPr lang="es-ES" sz="700" u="none" strike="noStrike">
+                          <a:effectLst/>
+                        </a:rPr>
+                        <a:t>Capacitar a todo el personal en diversas secciones</a:t>
+                      </a:r>
+                      <a:endParaRPr lang="es-ES" sz="700" b="0" i="0" u="none" strike="noStrike">
+                        <a:solidFill>
+                          <a:srgbClr val="000000"/>
+                        </a:solidFill>
+                        <a:effectLst/>
+                        <a:latin typeface="Calibri" panose="020F0502020204030204" pitchFamily="34" charset="0"/>
+                      </a:endParaRPr>
+                    </a:p>
+                  </a:txBody>
+                  <a:tcPr marL="0" marR="0" marT="0" marB="0"/>
+                </a:tc>
+                <a:tc>
+                  <a:txBody>
+                    <a:bodyPr/>
+                    <a:lstStyle/>
+                    <a:p>
+                      <a:pPr algn="l" fontAlgn="t"/>
+                      <a:r>
+                        <a:rPr lang="es-ES" sz="700" u="none" strike="noStrike">
+                          <a:effectLst/>
+                        </a:rPr>
+                        <a:t>Dividir tareas del trabajo diario entre integrantes disponibles y en caso de ausencia definitiva contratacion de personale</a:t>
+                      </a:r>
+                      <a:endParaRPr lang="es-ES" sz="700" b="0" i="0" u="none" strike="noStrike">
+                        <a:solidFill>
+                          <a:srgbClr val="000000"/>
+                        </a:solidFill>
+                        <a:effectLst/>
+                        <a:latin typeface="Calibri" panose="020F0502020204030204" pitchFamily="34" charset="0"/>
+                      </a:endParaRPr>
+                    </a:p>
+                  </a:txBody>
+                  <a:tcPr marL="0" marR="0" marT="0" marB="0"/>
+                </a:tc>
+                <a:tc>
+                  <a:txBody>
+                    <a:bodyPr/>
+                    <a:lstStyle/>
+                    <a:p>
+                      <a:pPr algn="ctr" fontAlgn="ctr"/>
+                      <a:r>
+                        <a:rPr lang="es-MX" sz="700" u="none" strike="noStrike">
+                          <a:effectLst/>
+                        </a:rPr>
+                        <a:t>Fidel Reyna</a:t>
+                      </a:r>
+                      <a:endParaRPr lang="es-MX" sz="700" b="0" i="0" u="none" strike="noStrike">
+                        <a:solidFill>
+                          <a:srgbClr val="000000"/>
+                        </a:solidFill>
+                        <a:effectLst/>
+                        <a:latin typeface="Calibri" panose="020F0502020204030204" pitchFamily="34" charset="0"/>
+                      </a:endParaRPr>
+                    </a:p>
+                  </a:txBody>
+                  <a:tcPr marL="0" marR="0" marT="0" marB="0" anchor="ctr"/>
+                </a:tc>
+                <a:tc>
+                  <a:txBody>
+                    <a:bodyPr/>
+                    <a:lstStyle/>
+                    <a:p>
+                      <a:pPr algn="ctr" fontAlgn="ctr"/>
+                      <a:r>
+                        <a:rPr lang="es-MX" sz="700" u="none" strike="noStrike">
+                          <a:effectLst/>
+                        </a:rPr>
+                        <a:t>Mitigado</a:t>
+                      </a:r>
+                      <a:endParaRPr lang="es-MX" sz="700" b="0" i="0" u="none" strike="noStrike">
+                        <a:solidFill>
+                          <a:srgbClr val="000000"/>
+                        </a:solidFill>
+                        <a:effectLst/>
+                        <a:latin typeface="Calibri" panose="020F0502020204030204" pitchFamily="34" charset="0"/>
+                      </a:endParaRPr>
+                    </a:p>
+                  </a:txBody>
+                  <a:tcPr marL="0" marR="0" marT="0" marB="0" anchor="ctr"/>
+                </a:tc>
+              </a:tr>
+              <a:tr h="389934">
+                <a:tc>
+                  <a:txBody>
+                    <a:bodyPr/>
+                    <a:lstStyle/>
+                    <a:p>
+                      <a:pPr algn="ctr" fontAlgn="ctr"/>
+                      <a:r>
+                        <a:rPr lang="es-MX" sz="700" u="none" strike="noStrike">
+                          <a:effectLst/>
+                        </a:rPr>
+                        <a:t>7</a:t>
+                      </a:r>
+                      <a:endParaRPr lang="es-MX" sz="700" b="0" i="0" u="none" strike="noStrike">
+                        <a:solidFill>
+                          <a:srgbClr val="000000"/>
+                        </a:solidFill>
+                        <a:effectLst/>
+                        <a:latin typeface="Calibri" panose="020F0502020204030204" pitchFamily="34" charset="0"/>
+                      </a:endParaRPr>
+                    </a:p>
+                  </a:txBody>
+                  <a:tcPr marL="0" marR="0" marT="0" marB="0" anchor="ctr"/>
+                </a:tc>
+                <a:tc>
+                  <a:txBody>
+                    <a:bodyPr/>
+                    <a:lstStyle/>
+                    <a:p>
+                      <a:pPr algn="l" fontAlgn="t"/>
+                      <a:r>
+                        <a:rPr lang="es-ES" sz="700" u="none" strike="noStrike">
+                          <a:effectLst/>
+                        </a:rPr>
+                        <a:t>Desviaciones de costos y esfuerzo elevadas a causa de exceso de clientes</a:t>
+                      </a:r>
+                      <a:endParaRPr lang="es-ES" sz="700" b="0" i="0" u="none" strike="noStrike">
+                        <a:solidFill>
+                          <a:srgbClr val="000000"/>
+                        </a:solidFill>
+                        <a:effectLst/>
+                        <a:latin typeface="Calibri" panose="020F0502020204030204" pitchFamily="34" charset="0"/>
+                      </a:endParaRPr>
+                    </a:p>
+                  </a:txBody>
+                  <a:tcPr marL="0" marR="0" marT="0" marB="0"/>
+                </a:tc>
+                <a:tc>
+                  <a:txBody>
+                    <a:bodyPr/>
+                    <a:lstStyle/>
+                    <a:p>
+                      <a:pPr algn="ctr" fontAlgn="ctr"/>
+                      <a:r>
+                        <a:rPr lang="es-MX" sz="700" u="none" strike="noStrike">
+                          <a:effectLst/>
+                        </a:rPr>
+                        <a:t>3</a:t>
+                      </a:r>
+                      <a:endParaRPr lang="es-MX" sz="700" b="0" i="0" u="none" strike="noStrike">
+                        <a:solidFill>
+                          <a:srgbClr val="000000"/>
+                        </a:solidFill>
+                        <a:effectLst/>
+                        <a:latin typeface="Calibri" panose="020F0502020204030204" pitchFamily="34" charset="0"/>
+                      </a:endParaRPr>
+                    </a:p>
+                  </a:txBody>
+                  <a:tcPr marL="0" marR="0" marT="0" marB="0" anchor="ctr"/>
+                </a:tc>
+                <a:tc>
+                  <a:txBody>
+                    <a:bodyPr/>
+                    <a:lstStyle/>
+                    <a:p>
+                      <a:pPr algn="ctr" fontAlgn="ctr"/>
+                      <a:r>
+                        <a:rPr lang="es-MX" sz="700" u="none" strike="noStrike">
+                          <a:effectLst/>
+                        </a:rPr>
+                        <a:t>60%</a:t>
+                      </a:r>
+                      <a:endParaRPr lang="es-MX" sz="700" b="0" i="0" u="none" strike="noStrike">
+                        <a:solidFill>
+                          <a:srgbClr val="000000"/>
+                        </a:solidFill>
+                        <a:effectLst/>
+                        <a:latin typeface="Calibri" panose="020F0502020204030204" pitchFamily="34" charset="0"/>
+                      </a:endParaRPr>
+                    </a:p>
+                  </a:txBody>
+                  <a:tcPr marL="0" marR="0" marT="0" marB="0" anchor="ctr"/>
+                </a:tc>
+                <a:tc>
+                  <a:txBody>
+                    <a:bodyPr/>
+                    <a:lstStyle/>
+                    <a:p>
+                      <a:pPr algn="ctr" fontAlgn="ctr"/>
+                      <a:r>
+                        <a:rPr lang="es-MX" sz="700" u="none" strike="noStrike">
+                          <a:effectLst/>
+                        </a:rPr>
+                        <a:t>1,8</a:t>
+                      </a:r>
+                      <a:endParaRPr lang="es-MX" sz="700" b="0" i="0" u="none" strike="noStrike">
+                        <a:solidFill>
+                          <a:srgbClr val="000000"/>
+                        </a:solidFill>
+                        <a:effectLst/>
+                        <a:latin typeface="Calibri" panose="020F0502020204030204" pitchFamily="34" charset="0"/>
+                      </a:endParaRPr>
+                    </a:p>
+                  </a:txBody>
+                  <a:tcPr marL="0" marR="0" marT="0" marB="0" anchor="ctr"/>
+                </a:tc>
+                <a:tc>
+                  <a:txBody>
+                    <a:bodyPr/>
+                    <a:lstStyle/>
+                    <a:p>
+                      <a:pPr algn="ctr" fontAlgn="ctr"/>
+                      <a:r>
+                        <a:rPr lang="es-MX" sz="700" u="none" strike="noStrike">
+                          <a:effectLst/>
+                        </a:rPr>
+                        <a:t>4</a:t>
+                      </a:r>
+                      <a:endParaRPr lang="es-MX" sz="700" b="0" i="0" u="none" strike="noStrike">
+                        <a:solidFill>
+                          <a:srgbClr val="000000"/>
+                        </a:solidFill>
+                        <a:effectLst/>
+                        <a:latin typeface="Calibri" panose="020F0502020204030204" pitchFamily="34" charset="0"/>
+                      </a:endParaRPr>
+                    </a:p>
+                  </a:txBody>
+                  <a:tcPr marL="0" marR="0" marT="0" marB="0" anchor="ctr"/>
+                </a:tc>
+                <a:tc>
+                  <a:txBody>
+                    <a:bodyPr/>
+                    <a:lstStyle/>
+                    <a:p>
+                      <a:pPr algn="l" fontAlgn="t"/>
+                      <a:r>
+                        <a:rPr lang="es-ES" sz="700" u="none" strike="noStrike">
+                          <a:effectLst/>
+                        </a:rPr>
+                        <a:t>Distribucion de trabajo entre equipo de trabajo</a:t>
+                      </a:r>
+                      <a:endParaRPr lang="es-ES" sz="700" b="0" i="0" u="none" strike="noStrike">
+                        <a:solidFill>
+                          <a:srgbClr val="000000"/>
+                        </a:solidFill>
+                        <a:effectLst/>
+                        <a:latin typeface="Calibri" panose="020F0502020204030204" pitchFamily="34" charset="0"/>
+                      </a:endParaRPr>
+                    </a:p>
+                  </a:txBody>
+                  <a:tcPr marL="0" marR="0" marT="0" marB="0"/>
+                </a:tc>
+                <a:tc>
+                  <a:txBody>
+                    <a:bodyPr/>
+                    <a:lstStyle/>
+                    <a:p>
+                      <a:pPr algn="l" fontAlgn="t"/>
+                      <a:r>
+                        <a:rPr lang="es-ES" sz="700" u="none" strike="noStrike">
+                          <a:effectLst/>
+                        </a:rPr>
+                        <a:t>Contratacion y capacitacion de personal nuevo que pueda cubrir necesidades de clientes</a:t>
+                      </a:r>
+                      <a:endParaRPr lang="es-ES" sz="700" b="0" i="0" u="none" strike="noStrike">
+                        <a:solidFill>
+                          <a:srgbClr val="000000"/>
+                        </a:solidFill>
+                        <a:effectLst/>
+                        <a:latin typeface="Calibri" panose="020F0502020204030204" pitchFamily="34" charset="0"/>
+                      </a:endParaRPr>
+                    </a:p>
+                  </a:txBody>
+                  <a:tcPr marL="0" marR="0" marT="0" marB="0"/>
+                </a:tc>
+                <a:tc>
+                  <a:txBody>
+                    <a:bodyPr/>
+                    <a:lstStyle/>
+                    <a:p>
+                      <a:pPr algn="ctr" fontAlgn="ctr"/>
+                      <a:r>
+                        <a:rPr lang="es-MX" sz="700" u="none" strike="noStrike">
+                          <a:effectLst/>
+                        </a:rPr>
+                        <a:t>Fidel Reyna</a:t>
+                      </a:r>
+                      <a:endParaRPr lang="es-MX" sz="700" b="0" i="0" u="none" strike="noStrike">
+                        <a:solidFill>
+                          <a:srgbClr val="000000"/>
+                        </a:solidFill>
+                        <a:effectLst/>
+                        <a:latin typeface="Calibri" panose="020F0502020204030204" pitchFamily="34" charset="0"/>
+                      </a:endParaRPr>
+                    </a:p>
+                  </a:txBody>
+                  <a:tcPr marL="0" marR="0" marT="0" marB="0" anchor="ctr"/>
+                </a:tc>
+                <a:tc>
+                  <a:txBody>
+                    <a:bodyPr/>
+                    <a:lstStyle/>
+                    <a:p>
+                      <a:pPr algn="ctr" fontAlgn="ctr"/>
+                      <a:r>
+                        <a:rPr lang="es-MX" sz="700" u="none" strike="noStrike">
+                          <a:effectLst/>
+                        </a:rPr>
                         <a:t>Abierto</a:t>
                       </a:r>
                       <a:endParaRPr lang="es-MX" sz="700" b="0" i="0" u="none" strike="noStrike">
@@ -5530,7 +6903,7 @@
                   <a:tcPr marL="0" marR="0" marT="0" marB="0" anchor="ctr"/>
                 </a:tc>
               </a:tr>
-              <a:tr h="780532">
+              <a:tr h="389934">
                 <a:tc>
                   <a:txBody>
                     <a:bodyPr/>
@@ -5541,7 +6914,7 @@
                         <a:rPr lang="es-MX" sz="700" u="none" strike="noStrike">
                           <a:effectLst/>
                         </a:rPr>
-                        <a:t>2</a:t>
+                        <a:t>8</a:t>
                       </a:r>
                       <a:endParaRPr lang="es-MX" sz="700" b="0" i="0" u="none" strike="noStrike">
                         <a:solidFill>
@@ -5561,10 +6934,125 @@
                     <a:p>
                       <a:pPr algn="l" fontAlgn="t"/>
                       <a:r>
+                        <a:rPr lang="es-MX" sz="700" u="none" strike="noStrike">
+                          <a:effectLst/>
+                        </a:rPr>
+                        <a:t>Perdida de repositorio de datos</a:t>
+                      </a:r>
+                      <a:endParaRPr lang="es-MX" sz="700" b="0" i="0" u="none" strike="noStrike">
+                        <a:solidFill>
+                          <a:srgbClr val="000000"/>
+                        </a:solidFill>
+                        <a:effectLst/>
+                        <a:latin typeface="Calibri" panose="020F0502020204030204" pitchFamily="34" charset="0"/>
+                      </a:endParaRPr>
+                    </a:p>
+                  </a:txBody>
+                  <a:tcPr marL="0" marR="0" marT="0" marB="0"/>
+                </a:tc>
+                <a:tc>
+                  <a:txBody>
+                    <a:bodyPr/>
+                    <a:lstStyle/>
+                    <a:p>
+                      <a:pPr algn="ctr" fontAlgn="ctr"/>
+                      <a:r>
+                        <a:rPr lang="es-MX" sz="700" u="none" strike="noStrike">
+                          <a:effectLst/>
+                        </a:rPr>
+                        <a:t>5</a:t>
+                      </a:r>
+                      <a:endParaRPr lang="es-MX" sz="700" b="0" i="0" u="none" strike="noStrike">
+                        <a:solidFill>
+                          <a:srgbClr val="000000"/>
+                        </a:solidFill>
+                        <a:effectLst/>
+                        <a:latin typeface="Calibri" panose="020F0502020204030204" pitchFamily="34" charset="0"/>
+                      </a:endParaRPr>
+                    </a:p>
+                  </a:txBody>
+                  <a:tcPr marL="0" marR="0" marT="0" marB="0" anchor="ctr"/>
+                </a:tc>
+                <a:tc>
+                  <a:txBody>
+                    <a:bodyPr/>
+                    <a:lstStyle/>
+                    <a:p>
+                      <a:pPr algn="ctr" fontAlgn="ctr"/>
+                      <a:r>
+                        <a:rPr lang="es-MX" sz="700" u="none" strike="noStrike">
+                          <a:effectLst/>
+                        </a:rPr>
+                        <a:t>15%</a:t>
+                      </a:r>
+                      <a:endParaRPr lang="es-MX" sz="700" b="0" i="0" u="none" strike="noStrike">
+                        <a:solidFill>
+                          <a:srgbClr val="000000"/>
+                        </a:solidFill>
+                        <a:effectLst/>
+                        <a:latin typeface="Calibri" panose="020F0502020204030204" pitchFamily="34" charset="0"/>
+                      </a:endParaRPr>
+                    </a:p>
+                  </a:txBody>
+                  <a:tcPr marL="0" marR="0" marT="0" marB="0" anchor="ctr"/>
+                </a:tc>
+                <a:tc>
+                  <a:txBody>
+                    <a:bodyPr/>
+                    <a:lstStyle/>
+                    <a:p>
+                      <a:pPr algn="ctr" fontAlgn="ctr"/>
+                      <a:r>
+                        <a:rPr lang="es-MX" sz="700" u="none" strike="noStrike">
+                          <a:effectLst/>
+                        </a:rPr>
+                        <a:t>0,75</a:t>
+                      </a:r>
+                      <a:endParaRPr lang="es-MX" sz="700" b="0" i="0" u="none" strike="noStrike">
+                        <a:solidFill>
+                          <a:srgbClr val="000000"/>
+                        </a:solidFill>
+                        <a:effectLst/>
+                        <a:latin typeface="Calibri" panose="020F0502020204030204" pitchFamily="34" charset="0"/>
+                      </a:endParaRPr>
+                    </a:p>
+                  </a:txBody>
+                  <a:tcPr marL="0" marR="0" marT="0" marB="0" anchor="ctr"/>
+                </a:tc>
+                <a:tc>
+                  <a:txBody>
+                    <a:bodyPr/>
+                    <a:lstStyle/>
+                    <a:p>
+                      <a:pPr algn="ctr" fontAlgn="ctr"/>
+                      <a:r>
+                        <a:rPr lang="es-MX" sz="700" u="none" strike="noStrike">
+                          <a:effectLst/>
+                        </a:rPr>
+                        <a:t>4</a:t>
+                      </a:r>
+                      <a:endParaRPr lang="es-MX" sz="700" b="0" i="0" u="none" strike="noStrike">
+                        <a:solidFill>
+                          <a:srgbClr val="000000"/>
+                        </a:solidFill>
+                        <a:effectLst/>
+                        <a:latin typeface="Calibri" panose="020F0502020204030204" pitchFamily="34" charset="0"/>
+                      </a:endParaRPr>
+                    </a:p>
+                  </a:txBody>
+                  <a:tcPr marL="0" marR="0" marT="0" marB="0" anchor="ctr"/>
+                </a:tc>
+                <a:tc>
+                  <a:txBody>
+                    <a:bodyPr/>
+                    <a:lstStyle/>
+                    <a:p>
+                      <a:pPr algn="l" fontAlgn="t"/>
+                      <a:r>
                         <a:rPr lang="es-ES" sz="700" u="none" strike="noStrike">
                           <a:effectLst/>
                         </a:rPr>
-                        <a:t>Si no se tiene el personal para la entrega del servicio calificado, la entrega del  podrían ser deficientes y no se lograría una entrega de calidad</a:t>
+                        <a:t>Generar espaldo secundario en maquinas ajenas al repositorio</a:t>
                       </a:r>
                       <a:endParaRPr lang="es-ES" sz="700" b="0" i="0" u="none" strike="noStrike">
                         <a:solidFill>
@@ -5582,12 +7070,35 @@
                     <a:bodyPr/>
                     <a:lstStyle/>
                     <a:p>
+                      <a:pPr algn="l" fontAlgn="t"/>
+                      <a:r>
+                        <a:rPr lang="es-ES" sz="700" u="none" strike="noStrike">
+                          <a:effectLst/>
+                        </a:rPr>
+                        <a:t>Generacion de un repositorio nuevo que contenga los datos del proyecto agregados</a:t>
+                      </a:r>
+                      <a:endParaRPr lang="es-ES" sz="700" b="0" i="0" u="none" strike="noStrike">
+                        <a:solidFill>
+                          <a:srgbClr val="000000"/>
+                        </a:solidFill>
+                        <a:effectLst/>
+                        <a:latin typeface="Calibri" panose="020F0502020204030204" pitchFamily="34" charset="0"/>
+                      </a:endParaRPr>
+                    </a:p>
+                  </a:txBody>
+                  <a:tcPr marL="0" marR="0" marT="0" marB="0"/>
+                </a:tc>
+                <a:tc>
+                  <a:txBody>
+                    <a:bodyPr/>
+                    <a:lstStyle/>
+                    <a:p>
                       <a:pPr algn="ctr" fontAlgn="ctr"/>
                       <a:r>
                         <a:rPr lang="es-MX" sz="700" u="none" strike="noStrike">
                           <a:effectLst/>
                         </a:rPr>
-                        <a:t>5</a:t>
+                        <a:t>Jovanny Zepeda</a:t>
                       </a:r>
                       <a:endParaRPr lang="es-MX" sz="700" b="0" i="0" u="none" strike="noStrike">
                         <a:solidFill>
@@ -5607,148 +7118,10 @@
                     <a:p>
                       <a:pPr algn="ctr" fontAlgn="ctr"/>
                       <a:r>
-                        <a:rPr lang="es-MX" sz="700" u="none" strike="noStrike">
-                          <a:effectLst/>
-                        </a:rPr>
-                        <a:t>30%</a:t>
-                      </a:r>
-                      <a:endParaRPr lang="es-MX" sz="700" b="0" i="0" u="none" strike="noStrike">
-                        <a:solidFill>
-                          <a:srgbClr val="000000"/>
-                        </a:solidFill>
-                        <a:effectLst/>
-                        <a:latin typeface="Calibri" panose="020F0502020204030204" pitchFamily="34" charset="0"/>
-                      </a:endParaRPr>
-                    </a:p>
-                  </a:txBody>
-                  <a:tcPr marL="0" marR="0" marT="0" marB="0" anchor="ctr"/>
-                </a:tc>
-                <a:tc>
-                  <a:txBody>
-                    <a:bodyPr/>
-                    <a:lstStyle/>
-                    <a:p>
-                      <a:pPr algn="ctr" fontAlgn="ctr"/>
-                      <a:r>
-                        <a:rPr lang="es-MX" sz="700" u="none" strike="noStrike">
-                          <a:effectLst/>
-                        </a:rPr>
-                        <a:t>1,5</a:t>
-                      </a:r>
-                      <a:endParaRPr lang="es-MX" sz="700" b="0" i="0" u="none" strike="noStrike">
-                        <a:solidFill>
-                          <a:srgbClr val="000000"/>
-                        </a:solidFill>
-                        <a:effectLst/>
-                        <a:latin typeface="Calibri" panose="020F0502020204030204" pitchFamily="34" charset="0"/>
-                      </a:endParaRPr>
-                    </a:p>
-                  </a:txBody>
-                  <a:tcPr marL="0" marR="0" marT="0" marB="0" anchor="ctr"/>
-                </a:tc>
-                <a:tc>
-                  <a:txBody>
-                    <a:bodyPr/>
-                    <a:lstStyle/>
-                    <a:p>
-                      <a:pPr algn="ctr" fontAlgn="ctr"/>
-                      <a:r>
-                        <a:rPr lang="es-MX" sz="700" u="none" strike="noStrike">
-                          <a:effectLst/>
-                        </a:rPr>
-                        <a:t>1</a:t>
-                      </a:r>
-                      <a:endParaRPr lang="es-MX" sz="700" b="0" i="0" u="none" strike="noStrike">
-                        <a:solidFill>
-                          <a:srgbClr val="000000"/>
-                        </a:solidFill>
-                        <a:effectLst/>
-                        <a:latin typeface="Calibri" panose="020F0502020204030204" pitchFamily="34" charset="0"/>
-                      </a:endParaRPr>
-                    </a:p>
-                  </a:txBody>
-                  <a:tcPr marL="0" marR="0" marT="0" marB="0" anchor="ctr"/>
-                </a:tc>
-                <a:tc>
-                  <a:txBody>
-                    <a:bodyPr/>
-                    <a:lstStyle/>
-                    <a:p>
-                      <a:pPr algn="l" fontAlgn="ctr"/>
-                      <a:r>
-                        <a:rPr lang="es-ES" sz="700" u="none" strike="noStrike">
-                          <a:effectLst/>
-                        </a:rPr>
-                        <a:t>Generar un plan de capacitación para incrementar las habilidades del personal</a:t>
-                      </a:r>
-                      <a:endParaRPr lang="es-ES" sz="700" b="0" i="0" u="none" strike="noStrike">
-                        <a:solidFill>
-                          <a:srgbClr val="000000"/>
-                        </a:solidFill>
-                        <a:effectLst/>
-                        <a:latin typeface="Calibri" panose="020F0502020204030204" pitchFamily="34" charset="0"/>
-                      </a:endParaRPr>
-                    </a:p>
-                  </a:txBody>
-                  <a:tcPr marL="0" marR="0" marT="0" marB="0" anchor="ctr"/>
-                </a:tc>
-                <a:tc>
-                  <a:txBody>
-                    <a:bodyPr/>
-                    <a:lstStyle/>
-                    <a:p>
-                      <a:pPr algn="l" fontAlgn="ctr"/>
-                      <a:r>
-                        <a:rPr lang="es-ES" sz="700" u="none" strike="noStrike">
-                          <a:effectLst/>
-                        </a:rPr>
-                        <a:t>Contratar personal experto en los servicios que ofrece la empresa</a:t>
-                      </a:r>
-                      <a:endParaRPr lang="es-ES" sz="700" b="0" i="0" u="none" strike="noStrike">
-                        <a:solidFill>
-                          <a:srgbClr val="000000"/>
-                        </a:solidFill>
-                        <a:effectLst/>
-                        <a:latin typeface="Calibri" panose="020F0502020204030204" pitchFamily="34" charset="0"/>
-                      </a:endParaRPr>
-                    </a:p>
-                  </a:txBody>
-                  <a:tcPr marL="0" marR="0" marT="0" marB="0" anchor="ctr"/>
-                </a:tc>
-                <a:tc>
-                  <a:txBody>
-                    <a:bodyPr/>
-                    <a:lstStyle/>
-                    <a:p>
-                      <a:pPr algn="ctr" fontAlgn="ctr"/>
-                      <a:r>
-                        <a:rPr lang="es-MX" sz="700" u="none" strike="noStrike">
-                          <a:effectLst/>
-                        </a:rPr>
-                        <a:t>Jovanny Zepeda</a:t>
-                      </a:r>
-                      <a:endParaRPr lang="es-MX" sz="700" b="0" i="0" u="none" strike="noStrike">
-                        <a:solidFill>
-                          <a:srgbClr val="000000"/>
-                        </a:solidFill>
-                        <a:effectLst/>
-                        <a:latin typeface="Calibri" panose="020F0502020204030204" pitchFamily="34" charset="0"/>
-                      </a:endParaRPr>
-                    </a:p>
-                  </a:txBody>
-                  <a:tcPr marL="0" marR="0" marT="0" marB="0" anchor="ctr"/>
-                </a:tc>
-                <a:tc>
-                  <a:txBody>
-                    <a:bodyPr/>
-                    <a:lstStyle/>
-                    <a:p>
-                      <a:pPr algn="ctr" fontAlgn="ctr"/>
-                      <a:r>
                         <a:rPr lang="es-MX" sz="700" u="none" strike="noStrike" dirty="0">
                           <a:effectLst/>
                         </a:rPr>
-                        <a:t>Abierto</a:t>
+                        <a:t>Mitigado</a:t>
                       </a:r>
                       <a:endParaRPr lang="es-MX" sz="700" b="0" i="0" u="none" strike="noStrike" dirty="0">
                         <a:solidFill>
@@ -5766,6 +7139,36 @@
           </a:graphicData>
         </a:graphic>
       </p:graphicFrame>
+      <p:sp>
+        <p:nvSpPr>
+          <p:cNvPr id="4" name="CuadroTexto 3"/>
+          <p:cNvSpPr txBox="1"/>
+          <p:nvPr/>
+        </p:nvSpPr>
+        <p:spPr>
+          <a:xfrm>
+            <a:off x="457200" y="5733256"/>
+            <a:ext cx="8686800" cy="646331"/>
+          </a:xfrm>
+          <a:prstGeom prst="rect">
+            <a:avLst/>
+          </a:prstGeom>
+          <a:noFill/>
+        </p:spPr>
+        <p:txBody>
+          <a:bodyPr wrap="square" rtlCol="0">
+            <a:spAutoFit/>
+          </a:bodyPr>
+          <a:lstStyle/>
+          <a:p>
+            <a:r>
+              <a:rPr lang="es-MX" dirty="0" smtClean="0"/>
+              <a:t>No se genera cambios en riesgos encontrados ni se encuentran riesgos potenciales que deban ser anexados.</a:t>
+            </a:r>
+            <a:endParaRPr lang="es-MX" dirty="0"/>
+          </a:p>
+        </p:txBody>
+      </p:sp>
     </p:spTree>
     <p:extLst>
       <p:ext uri="{BB962C8B-B14F-4D97-AF65-F5344CB8AC3E}">
@@ -5966,6 +7369,1159 @@
 </p:sld>
 </file>
 
+<file path=ppt/slides/slide13.xml><?xml version="1.0" encoding="utf-8"?>
+<p:sld xmlns:a="http://schemas.openxmlformats.org/drawingml/2006/main" xmlns:r="http://schemas.openxmlformats.org/officeDocument/2006/relationships" xmlns:p="http://schemas.openxmlformats.org/presentationml/2006/main">
+  <p:cSld>
+    <p:spTree>
+      <p:nvGrpSpPr>
+        <p:cNvPr id="1" name=""/>
+        <p:cNvGrpSpPr/>
+        <p:nvPr/>
+      </p:nvGrpSpPr>
+      <p:grpSpPr>
+        <a:xfrm>
+          <a:off x="0" y="0"/>
+          <a:ext cx="0" cy="0"/>
+          <a:chOff x="0" y="0"/>
+          <a:chExt cx="0" cy="0"/>
+        </a:xfrm>
+      </p:grpSpPr>
+      <p:graphicFrame>
+        <p:nvGraphicFramePr>
+          <p:cNvPr id="5" name="Tabla 4"/>
+          <p:cNvGraphicFramePr>
+            <a:graphicFrameLocks noGrp="1"/>
+          </p:cNvGraphicFramePr>
+          <p:nvPr>
+            <p:extLst>
+              <p:ext uri="{D42A27DB-BD31-4B8C-83A1-F6EECF244321}">
+                <p14:modId xmlns:p14="http://schemas.microsoft.com/office/powerpoint/2010/main" val="4278427399"/>
+              </p:ext>
+            </p:extLst>
+          </p:nvPr>
+        </p:nvGraphicFramePr>
+        <p:xfrm>
+          <a:off x="755576" y="1628804"/>
+          <a:ext cx="8136904" cy="4104457"/>
+        </p:xfrm>
+        <a:graphic>
+          <a:graphicData uri="http://schemas.openxmlformats.org/drawingml/2006/table">
+            <a:tbl>
+              <a:tblPr>
+                <a:tableStyleId>{5C22544A-7EE6-4342-B048-85BDC9FD1C3A}</a:tableStyleId>
+              </a:tblPr>
+              <a:tblGrid>
+                <a:gridCol w="1315055"/>
+                <a:gridCol w="2794493"/>
+                <a:gridCol w="2630109"/>
+                <a:gridCol w="1397247"/>
+              </a:tblGrid>
+              <a:tr h="319962">
+                <a:tc gridSpan="4">
+                  <a:txBody>
+                    <a:bodyPr/>
+                    <a:lstStyle/>
+                    <a:p>
+                      <a:pPr algn="ctr" fontAlgn="ctr"/>
+                      <a:r>
+                        <a:rPr lang="es-ES" sz="1100" u="none" strike="noStrike">
+                          <a:effectLst/>
+                        </a:rPr>
+                        <a:t>Bitacora de Respaldos semanales en el servicio de tickets</a:t>
+                      </a:r>
+                      <a:endParaRPr lang="es-ES" sz="1100" b="0" i="0" u="none" strike="noStrike">
+                        <a:solidFill>
+                          <a:srgbClr val="000000"/>
+                        </a:solidFill>
+                        <a:effectLst/>
+                        <a:latin typeface="Calibri" panose="020F0502020204030204" pitchFamily="34" charset="0"/>
+                      </a:endParaRPr>
+                    </a:p>
+                  </a:txBody>
+                  <a:tcPr marL="9525" marR="9525" marT="9525" marB="0" anchor="ctr"/>
+                </a:tc>
+                <a:tc hMerge="1">
+                  <a:txBody>
+                    <a:bodyPr/>
+                    <a:lstStyle/>
+                    <a:p>
+                      <a:endParaRPr lang="es-MX"/>
+                    </a:p>
+                  </a:txBody>
+                  <a:tcPr/>
+                </a:tc>
+                <a:tc hMerge="1">
+                  <a:txBody>
+                    <a:bodyPr/>
+                    <a:lstStyle/>
+                    <a:p>
+                      <a:endParaRPr lang="es-MX"/>
+                    </a:p>
+                  </a:txBody>
+                  <a:tcPr/>
+                </a:tc>
+                <a:tc hMerge="1">
+                  <a:txBody>
+                    <a:bodyPr/>
+                    <a:lstStyle/>
+                    <a:p>
+                      <a:endParaRPr lang="es-MX"/>
+                    </a:p>
+                  </a:txBody>
+                  <a:tcPr/>
+                </a:tc>
+              </a:tr>
+              <a:tr h="344045">
+                <a:tc>
+                  <a:txBody>
+                    <a:bodyPr/>
+                    <a:lstStyle/>
+                    <a:p>
+                      <a:pPr algn="ctr" fontAlgn="b"/>
+                      <a:r>
+                        <a:rPr lang="es-MX" sz="1100" u="none" strike="noStrike">
+                          <a:effectLst/>
+                        </a:rPr>
+                        <a:t>Fecha </a:t>
+                      </a:r>
+                      <a:endParaRPr lang="es-MX" sz="1100" b="0" i="0" u="none" strike="noStrike">
+                        <a:solidFill>
+                          <a:srgbClr val="000000"/>
+                        </a:solidFill>
+                        <a:effectLst/>
+                        <a:latin typeface="Calibri" panose="020F0502020204030204" pitchFamily="34" charset="0"/>
+                      </a:endParaRPr>
+                    </a:p>
+                  </a:txBody>
+                  <a:tcPr marL="9525" marR="9525" marT="9525" marB="0" anchor="b"/>
+                </a:tc>
+                <a:tc>
+                  <a:txBody>
+                    <a:bodyPr/>
+                    <a:lstStyle/>
+                    <a:p>
+                      <a:pPr algn="ctr" fontAlgn="b"/>
+                      <a:r>
+                        <a:rPr lang="es-MX" sz="1100" u="none" strike="noStrike">
+                          <a:effectLst/>
+                        </a:rPr>
+                        <a:t>Responsable </a:t>
+                      </a:r>
+                      <a:endParaRPr lang="es-MX" sz="1100" b="0" i="0" u="none" strike="noStrike">
+                        <a:solidFill>
+                          <a:srgbClr val="000000"/>
+                        </a:solidFill>
+                        <a:effectLst/>
+                        <a:latin typeface="Calibri" panose="020F0502020204030204" pitchFamily="34" charset="0"/>
+                      </a:endParaRPr>
+                    </a:p>
+                  </a:txBody>
+                  <a:tcPr marL="9525" marR="9525" marT="9525" marB="0" anchor="b"/>
+                </a:tc>
+                <a:tc>
+                  <a:txBody>
+                    <a:bodyPr/>
+                    <a:lstStyle/>
+                    <a:p>
+                      <a:pPr algn="ctr" fontAlgn="b"/>
+                      <a:r>
+                        <a:rPr lang="es-MX" sz="1100" u="none" strike="noStrike">
+                          <a:effectLst/>
+                        </a:rPr>
+                        <a:t>fecha en Repositorio</a:t>
+                      </a:r>
+                      <a:endParaRPr lang="es-MX" sz="1100" b="0" i="0" u="none" strike="noStrike">
+                        <a:solidFill>
+                          <a:srgbClr val="000000"/>
+                        </a:solidFill>
+                        <a:effectLst/>
+                        <a:latin typeface="Calibri" panose="020F0502020204030204" pitchFamily="34" charset="0"/>
+                      </a:endParaRPr>
+                    </a:p>
+                  </a:txBody>
+                  <a:tcPr marL="9525" marR="9525" marT="9525" marB="0" anchor="b"/>
+                </a:tc>
+                <a:tc>
+                  <a:txBody>
+                    <a:bodyPr/>
+                    <a:lstStyle/>
+                    <a:p>
+                      <a:pPr algn="ctr" fontAlgn="b"/>
+                      <a:r>
+                        <a:rPr lang="es-MX" sz="1100" u="none" strike="noStrike">
+                          <a:effectLst/>
+                        </a:rPr>
+                        <a:t>Estado</a:t>
+                      </a:r>
+                      <a:endParaRPr lang="es-MX" sz="1100" b="0" i="0" u="none" strike="noStrike">
+                        <a:solidFill>
+                          <a:srgbClr val="000000"/>
+                        </a:solidFill>
+                        <a:effectLst/>
+                        <a:latin typeface="Calibri" panose="020F0502020204030204" pitchFamily="34" charset="0"/>
+                      </a:endParaRPr>
+                    </a:p>
+                  </a:txBody>
+                  <a:tcPr marL="9525" marR="9525" marT="9525" marB="0" anchor="b"/>
+                </a:tc>
+              </a:tr>
+              <a:tr h="344045">
+                <a:tc>
+                  <a:txBody>
+                    <a:bodyPr/>
+                    <a:lstStyle/>
+                    <a:p>
+                      <a:pPr algn="r" fontAlgn="b"/>
+                      <a:r>
+                        <a:rPr lang="es-MX" sz="1100" u="none" strike="noStrike">
+                          <a:effectLst/>
+                        </a:rPr>
+                        <a:t>20/03/2015</a:t>
+                      </a:r>
+                      <a:endParaRPr lang="es-MX" sz="1100" b="0" i="0" u="none" strike="noStrike">
+                        <a:solidFill>
+                          <a:srgbClr val="000000"/>
+                        </a:solidFill>
+                        <a:effectLst/>
+                        <a:latin typeface="Calibri" panose="020F0502020204030204" pitchFamily="34" charset="0"/>
+                      </a:endParaRPr>
+                    </a:p>
+                  </a:txBody>
+                  <a:tcPr marL="9525" marR="9525" marT="9525" marB="0" anchor="b"/>
+                </a:tc>
+                <a:tc>
+                  <a:txBody>
+                    <a:bodyPr/>
+                    <a:lstStyle/>
+                    <a:p>
+                      <a:pPr algn="ctr" fontAlgn="b"/>
+                      <a:r>
+                        <a:rPr lang="es-MX" sz="1100" u="none" strike="noStrike">
+                          <a:effectLst/>
+                        </a:rPr>
+                        <a:t>Jovanny Zepeda</a:t>
+                      </a:r>
+                      <a:endParaRPr lang="es-MX" sz="1100" b="0" i="0" u="none" strike="noStrike">
+                        <a:solidFill>
+                          <a:srgbClr val="000000"/>
+                        </a:solidFill>
+                        <a:effectLst/>
+                        <a:latin typeface="Calibri" panose="020F0502020204030204" pitchFamily="34" charset="0"/>
+                      </a:endParaRPr>
+                    </a:p>
+                  </a:txBody>
+                  <a:tcPr marL="9525" marR="9525" marT="9525" marB="0" anchor="b"/>
+                </a:tc>
+                <a:tc>
+                  <a:txBody>
+                    <a:bodyPr/>
+                    <a:lstStyle/>
+                    <a:p>
+                      <a:pPr algn="ctr" fontAlgn="b"/>
+                      <a:r>
+                        <a:rPr lang="es-MX" sz="1100" u="none" strike="noStrike">
+                          <a:effectLst/>
+                        </a:rPr>
+                        <a:t>20/03/2015</a:t>
+                      </a:r>
+                      <a:endParaRPr lang="es-MX" sz="1100" b="0" i="0" u="none" strike="noStrike">
+                        <a:solidFill>
+                          <a:srgbClr val="000000"/>
+                        </a:solidFill>
+                        <a:effectLst/>
+                        <a:latin typeface="Calibri" panose="020F0502020204030204" pitchFamily="34" charset="0"/>
+                      </a:endParaRPr>
+                    </a:p>
+                  </a:txBody>
+                  <a:tcPr marL="9525" marR="9525" marT="9525" marB="0" anchor="b"/>
+                </a:tc>
+                <a:tc>
+                  <a:txBody>
+                    <a:bodyPr/>
+                    <a:lstStyle/>
+                    <a:p>
+                      <a:pPr algn="l" fontAlgn="b"/>
+                      <a:r>
+                        <a:rPr lang="es-MX" sz="1100" u="none" strike="noStrike">
+                          <a:effectLst/>
+                        </a:rPr>
+                        <a:t>Realizada</a:t>
+                      </a:r>
+                      <a:endParaRPr lang="es-MX" sz="1100" b="0" i="0" u="none" strike="noStrike">
+                        <a:solidFill>
+                          <a:srgbClr val="000000"/>
+                        </a:solidFill>
+                        <a:effectLst/>
+                        <a:latin typeface="Calibri" panose="020F0502020204030204" pitchFamily="34" charset="0"/>
+                      </a:endParaRPr>
+                    </a:p>
+                  </a:txBody>
+                  <a:tcPr marL="9525" marR="9525" marT="9525" marB="0" anchor="b"/>
+                </a:tc>
+              </a:tr>
+              <a:tr h="344045">
+                <a:tc>
+                  <a:txBody>
+                    <a:bodyPr/>
+                    <a:lstStyle/>
+                    <a:p>
+                      <a:pPr algn="r" fontAlgn="b"/>
+                      <a:r>
+                        <a:rPr lang="es-MX" sz="1100" u="none" strike="noStrike">
+                          <a:effectLst/>
+                        </a:rPr>
+                        <a:t>27/03/2015</a:t>
+                      </a:r>
+                      <a:endParaRPr lang="es-MX" sz="1100" b="0" i="0" u="none" strike="noStrike">
+                        <a:solidFill>
+                          <a:srgbClr val="000000"/>
+                        </a:solidFill>
+                        <a:effectLst/>
+                        <a:latin typeface="Calibri" panose="020F0502020204030204" pitchFamily="34" charset="0"/>
+                      </a:endParaRPr>
+                    </a:p>
+                  </a:txBody>
+                  <a:tcPr marL="9525" marR="9525" marT="9525" marB="0" anchor="b"/>
+                </a:tc>
+                <a:tc>
+                  <a:txBody>
+                    <a:bodyPr/>
+                    <a:lstStyle/>
+                    <a:p>
+                      <a:pPr algn="ctr" fontAlgn="b"/>
+                      <a:r>
+                        <a:rPr lang="es-MX" sz="1100" u="none" strike="noStrike">
+                          <a:effectLst/>
+                        </a:rPr>
+                        <a:t>Jovanny Zepeda</a:t>
+                      </a:r>
+                      <a:endParaRPr lang="es-MX" sz="1100" b="0" i="0" u="none" strike="noStrike">
+                        <a:solidFill>
+                          <a:srgbClr val="000000"/>
+                        </a:solidFill>
+                        <a:effectLst/>
+                        <a:latin typeface="Calibri" panose="020F0502020204030204" pitchFamily="34" charset="0"/>
+                      </a:endParaRPr>
+                    </a:p>
+                  </a:txBody>
+                  <a:tcPr marL="9525" marR="9525" marT="9525" marB="0" anchor="b"/>
+                </a:tc>
+                <a:tc>
+                  <a:txBody>
+                    <a:bodyPr/>
+                    <a:lstStyle/>
+                    <a:p>
+                      <a:pPr algn="ctr" fontAlgn="b"/>
+                      <a:r>
+                        <a:rPr lang="es-MX" sz="1100" u="none" strike="noStrike">
+                          <a:effectLst/>
+                        </a:rPr>
+                        <a:t>27/03/2015</a:t>
+                      </a:r>
+                      <a:endParaRPr lang="es-MX" sz="1100" b="0" i="0" u="none" strike="noStrike">
+                        <a:solidFill>
+                          <a:srgbClr val="000000"/>
+                        </a:solidFill>
+                        <a:effectLst/>
+                        <a:latin typeface="Calibri" panose="020F0502020204030204" pitchFamily="34" charset="0"/>
+                      </a:endParaRPr>
+                    </a:p>
+                  </a:txBody>
+                  <a:tcPr marL="9525" marR="9525" marT="9525" marB="0" anchor="b"/>
+                </a:tc>
+                <a:tc>
+                  <a:txBody>
+                    <a:bodyPr/>
+                    <a:lstStyle/>
+                    <a:p>
+                      <a:pPr algn="l" fontAlgn="b"/>
+                      <a:r>
+                        <a:rPr lang="es-MX" sz="1100" u="none" strike="noStrike">
+                          <a:effectLst/>
+                        </a:rPr>
+                        <a:t>Realizada</a:t>
+                      </a:r>
+                      <a:endParaRPr lang="es-MX" sz="1100" b="0" i="0" u="none" strike="noStrike">
+                        <a:solidFill>
+                          <a:srgbClr val="000000"/>
+                        </a:solidFill>
+                        <a:effectLst/>
+                        <a:latin typeface="Calibri" panose="020F0502020204030204" pitchFamily="34" charset="0"/>
+                      </a:endParaRPr>
+                    </a:p>
+                  </a:txBody>
+                  <a:tcPr marL="9525" marR="9525" marT="9525" marB="0" anchor="b"/>
+                </a:tc>
+              </a:tr>
+              <a:tr h="344045">
+                <a:tc>
+                  <a:txBody>
+                    <a:bodyPr/>
+                    <a:lstStyle/>
+                    <a:p>
+                      <a:pPr algn="r" fontAlgn="b"/>
+                      <a:r>
+                        <a:rPr lang="es-MX" sz="1100" u="none" strike="noStrike">
+                          <a:effectLst/>
+                        </a:rPr>
+                        <a:t>03/04/2015</a:t>
+                      </a:r>
+                      <a:endParaRPr lang="es-MX" sz="1100" b="0" i="0" u="none" strike="noStrike">
+                        <a:solidFill>
+                          <a:srgbClr val="000000"/>
+                        </a:solidFill>
+                        <a:effectLst/>
+                        <a:latin typeface="Calibri" panose="020F0502020204030204" pitchFamily="34" charset="0"/>
+                      </a:endParaRPr>
+                    </a:p>
+                  </a:txBody>
+                  <a:tcPr marL="9525" marR="9525" marT="9525" marB="0" anchor="b"/>
+                </a:tc>
+                <a:tc>
+                  <a:txBody>
+                    <a:bodyPr/>
+                    <a:lstStyle/>
+                    <a:p>
+                      <a:pPr algn="ctr" fontAlgn="b"/>
+                      <a:r>
+                        <a:rPr lang="es-MX" sz="1100" u="none" strike="noStrike">
+                          <a:effectLst/>
+                        </a:rPr>
+                        <a:t>Jovanny Zepeda</a:t>
+                      </a:r>
+                      <a:endParaRPr lang="es-MX" sz="1100" b="0" i="0" u="none" strike="noStrike">
+                        <a:solidFill>
+                          <a:srgbClr val="000000"/>
+                        </a:solidFill>
+                        <a:effectLst/>
+                        <a:latin typeface="Calibri" panose="020F0502020204030204" pitchFamily="34" charset="0"/>
+                      </a:endParaRPr>
+                    </a:p>
+                  </a:txBody>
+                  <a:tcPr marL="9525" marR="9525" marT="9525" marB="0" anchor="b"/>
+                </a:tc>
+                <a:tc>
+                  <a:txBody>
+                    <a:bodyPr/>
+                    <a:lstStyle/>
+                    <a:p>
+                      <a:pPr algn="ctr" fontAlgn="b"/>
+                      <a:r>
+                        <a:rPr lang="es-MX" sz="1100" u="none" strike="noStrike">
+                          <a:effectLst/>
+                        </a:rPr>
+                        <a:t>03/04/2015</a:t>
+                      </a:r>
+                      <a:endParaRPr lang="es-MX" sz="1100" b="0" i="0" u="none" strike="noStrike">
+                        <a:solidFill>
+                          <a:srgbClr val="000000"/>
+                        </a:solidFill>
+                        <a:effectLst/>
+                        <a:latin typeface="Calibri" panose="020F0502020204030204" pitchFamily="34" charset="0"/>
+                      </a:endParaRPr>
+                    </a:p>
+                  </a:txBody>
+                  <a:tcPr marL="9525" marR="9525" marT="9525" marB="0" anchor="b"/>
+                </a:tc>
+                <a:tc>
+                  <a:txBody>
+                    <a:bodyPr/>
+                    <a:lstStyle/>
+                    <a:p>
+                      <a:pPr algn="l" fontAlgn="b"/>
+                      <a:r>
+                        <a:rPr lang="es-MX" sz="1100" u="none" strike="noStrike">
+                          <a:effectLst/>
+                        </a:rPr>
+                        <a:t>Realizada</a:t>
+                      </a:r>
+                      <a:endParaRPr lang="es-MX" sz="1100" b="0" i="0" u="none" strike="noStrike">
+                        <a:solidFill>
+                          <a:srgbClr val="000000"/>
+                        </a:solidFill>
+                        <a:effectLst/>
+                        <a:latin typeface="Calibri" panose="020F0502020204030204" pitchFamily="34" charset="0"/>
+                      </a:endParaRPr>
+                    </a:p>
+                  </a:txBody>
+                  <a:tcPr marL="9525" marR="9525" marT="9525" marB="0" anchor="b"/>
+                </a:tc>
+              </a:tr>
+              <a:tr h="344045">
+                <a:tc>
+                  <a:txBody>
+                    <a:bodyPr/>
+                    <a:lstStyle/>
+                    <a:p>
+                      <a:pPr algn="r" fontAlgn="b"/>
+                      <a:r>
+                        <a:rPr lang="es-MX" sz="1100" u="none" strike="noStrike">
+                          <a:effectLst/>
+                        </a:rPr>
+                        <a:t>10/04/2015</a:t>
+                      </a:r>
+                      <a:endParaRPr lang="es-MX" sz="1100" b="0" i="0" u="none" strike="noStrike">
+                        <a:solidFill>
+                          <a:srgbClr val="000000"/>
+                        </a:solidFill>
+                        <a:effectLst/>
+                        <a:latin typeface="Calibri" panose="020F0502020204030204" pitchFamily="34" charset="0"/>
+                      </a:endParaRPr>
+                    </a:p>
+                  </a:txBody>
+                  <a:tcPr marL="9525" marR="9525" marT="9525" marB="0" anchor="b"/>
+                </a:tc>
+                <a:tc>
+                  <a:txBody>
+                    <a:bodyPr/>
+                    <a:lstStyle/>
+                    <a:p>
+                      <a:pPr algn="ctr" fontAlgn="b"/>
+                      <a:r>
+                        <a:rPr lang="es-MX" sz="1100" u="none" strike="noStrike">
+                          <a:effectLst/>
+                        </a:rPr>
+                        <a:t>Jovanny Zepeda</a:t>
+                      </a:r>
+                      <a:endParaRPr lang="es-MX" sz="1100" b="0" i="0" u="none" strike="noStrike">
+                        <a:solidFill>
+                          <a:srgbClr val="000000"/>
+                        </a:solidFill>
+                        <a:effectLst/>
+                        <a:latin typeface="Calibri" panose="020F0502020204030204" pitchFamily="34" charset="0"/>
+                      </a:endParaRPr>
+                    </a:p>
+                  </a:txBody>
+                  <a:tcPr marL="9525" marR="9525" marT="9525" marB="0" anchor="b"/>
+                </a:tc>
+                <a:tc>
+                  <a:txBody>
+                    <a:bodyPr/>
+                    <a:lstStyle/>
+                    <a:p>
+                      <a:pPr algn="ctr" fontAlgn="b"/>
+                      <a:r>
+                        <a:rPr lang="es-MX" sz="1100" u="none" strike="noStrike">
+                          <a:effectLst/>
+                        </a:rPr>
+                        <a:t>10/04/2015</a:t>
+                      </a:r>
+                      <a:endParaRPr lang="es-MX" sz="1100" b="0" i="0" u="none" strike="noStrike">
+                        <a:solidFill>
+                          <a:srgbClr val="000000"/>
+                        </a:solidFill>
+                        <a:effectLst/>
+                        <a:latin typeface="Calibri" panose="020F0502020204030204" pitchFamily="34" charset="0"/>
+                      </a:endParaRPr>
+                    </a:p>
+                  </a:txBody>
+                  <a:tcPr marL="9525" marR="9525" marT="9525" marB="0" anchor="b"/>
+                </a:tc>
+                <a:tc>
+                  <a:txBody>
+                    <a:bodyPr/>
+                    <a:lstStyle/>
+                    <a:p>
+                      <a:pPr algn="l" fontAlgn="b"/>
+                      <a:r>
+                        <a:rPr lang="es-MX" sz="1100" u="none" strike="noStrike">
+                          <a:effectLst/>
+                        </a:rPr>
+                        <a:t>Realizada</a:t>
+                      </a:r>
+                      <a:endParaRPr lang="es-MX" sz="1100" b="0" i="0" u="none" strike="noStrike">
+                        <a:solidFill>
+                          <a:srgbClr val="000000"/>
+                        </a:solidFill>
+                        <a:effectLst/>
+                        <a:latin typeface="Calibri" panose="020F0502020204030204" pitchFamily="34" charset="0"/>
+                      </a:endParaRPr>
+                    </a:p>
+                  </a:txBody>
+                  <a:tcPr marL="9525" marR="9525" marT="9525" marB="0" anchor="b"/>
+                </a:tc>
+              </a:tr>
+              <a:tr h="344045">
+                <a:tc>
+                  <a:txBody>
+                    <a:bodyPr/>
+                    <a:lstStyle/>
+                    <a:p>
+                      <a:pPr algn="r" fontAlgn="b"/>
+                      <a:r>
+                        <a:rPr lang="es-MX" sz="1100" u="none" strike="noStrike">
+                          <a:effectLst/>
+                        </a:rPr>
+                        <a:t>17/04/2015</a:t>
+                      </a:r>
+                      <a:endParaRPr lang="es-MX" sz="1100" b="0" i="0" u="none" strike="noStrike">
+                        <a:solidFill>
+                          <a:srgbClr val="000000"/>
+                        </a:solidFill>
+                        <a:effectLst/>
+                        <a:latin typeface="Calibri" panose="020F0502020204030204" pitchFamily="34" charset="0"/>
+                      </a:endParaRPr>
+                    </a:p>
+                  </a:txBody>
+                  <a:tcPr marL="9525" marR="9525" marT="9525" marB="0" anchor="b"/>
+                </a:tc>
+                <a:tc>
+                  <a:txBody>
+                    <a:bodyPr/>
+                    <a:lstStyle/>
+                    <a:p>
+                      <a:pPr algn="ctr" fontAlgn="b"/>
+                      <a:r>
+                        <a:rPr lang="es-MX" sz="1100" u="none" strike="noStrike">
+                          <a:effectLst/>
+                        </a:rPr>
+                        <a:t>Jovanny Zepeda</a:t>
+                      </a:r>
+                      <a:endParaRPr lang="es-MX" sz="1100" b="0" i="0" u="none" strike="noStrike">
+                        <a:solidFill>
+                          <a:srgbClr val="000000"/>
+                        </a:solidFill>
+                        <a:effectLst/>
+                        <a:latin typeface="Calibri" panose="020F0502020204030204" pitchFamily="34" charset="0"/>
+                      </a:endParaRPr>
+                    </a:p>
+                  </a:txBody>
+                  <a:tcPr marL="9525" marR="9525" marT="9525" marB="0" anchor="b"/>
+                </a:tc>
+                <a:tc>
+                  <a:txBody>
+                    <a:bodyPr/>
+                    <a:lstStyle/>
+                    <a:p>
+                      <a:pPr algn="ctr" fontAlgn="b"/>
+                      <a:r>
+                        <a:rPr lang="es-MX" sz="1100" u="none" strike="noStrike">
+                          <a:effectLst/>
+                        </a:rPr>
+                        <a:t>17/04/2015</a:t>
+                      </a:r>
+                      <a:endParaRPr lang="es-MX" sz="1100" b="0" i="0" u="none" strike="noStrike">
+                        <a:solidFill>
+                          <a:srgbClr val="000000"/>
+                        </a:solidFill>
+                        <a:effectLst/>
+                        <a:latin typeface="Calibri" panose="020F0502020204030204" pitchFamily="34" charset="0"/>
+                      </a:endParaRPr>
+                    </a:p>
+                  </a:txBody>
+                  <a:tcPr marL="9525" marR="9525" marT="9525" marB="0" anchor="b"/>
+                </a:tc>
+                <a:tc>
+                  <a:txBody>
+                    <a:bodyPr/>
+                    <a:lstStyle/>
+                    <a:p>
+                      <a:pPr algn="l" fontAlgn="b"/>
+                      <a:r>
+                        <a:rPr lang="es-MX" sz="1100" u="none" strike="noStrike">
+                          <a:effectLst/>
+                        </a:rPr>
+                        <a:t>Realizada</a:t>
+                      </a:r>
+                      <a:endParaRPr lang="es-MX" sz="1100" b="0" i="0" u="none" strike="noStrike">
+                        <a:solidFill>
+                          <a:srgbClr val="000000"/>
+                        </a:solidFill>
+                        <a:effectLst/>
+                        <a:latin typeface="Calibri" panose="020F0502020204030204" pitchFamily="34" charset="0"/>
+                      </a:endParaRPr>
+                    </a:p>
+                  </a:txBody>
+                  <a:tcPr marL="9525" marR="9525" marT="9525" marB="0" anchor="b"/>
+                </a:tc>
+              </a:tr>
+              <a:tr h="344045">
+                <a:tc>
+                  <a:txBody>
+                    <a:bodyPr/>
+                    <a:lstStyle/>
+                    <a:p>
+                      <a:pPr algn="r" fontAlgn="b"/>
+                      <a:r>
+                        <a:rPr lang="es-MX" sz="1100" u="none" strike="noStrike">
+                          <a:effectLst/>
+                        </a:rPr>
+                        <a:t>24/04/2015</a:t>
+                      </a:r>
+                      <a:endParaRPr lang="es-MX" sz="1100" b="0" i="0" u="none" strike="noStrike">
+                        <a:solidFill>
+                          <a:srgbClr val="000000"/>
+                        </a:solidFill>
+                        <a:effectLst/>
+                        <a:latin typeface="Calibri" panose="020F0502020204030204" pitchFamily="34" charset="0"/>
+                      </a:endParaRPr>
+                    </a:p>
+                  </a:txBody>
+                  <a:tcPr marL="9525" marR="9525" marT="9525" marB="0" anchor="b"/>
+                </a:tc>
+                <a:tc>
+                  <a:txBody>
+                    <a:bodyPr/>
+                    <a:lstStyle/>
+                    <a:p>
+                      <a:pPr algn="ctr" fontAlgn="b"/>
+                      <a:r>
+                        <a:rPr lang="es-MX" sz="1100" u="none" strike="noStrike">
+                          <a:effectLst/>
+                        </a:rPr>
+                        <a:t>Jovanny Zepeda</a:t>
+                      </a:r>
+                      <a:endParaRPr lang="es-MX" sz="1100" b="0" i="0" u="none" strike="noStrike">
+                        <a:solidFill>
+                          <a:srgbClr val="000000"/>
+                        </a:solidFill>
+                        <a:effectLst/>
+                        <a:latin typeface="Calibri" panose="020F0502020204030204" pitchFamily="34" charset="0"/>
+                      </a:endParaRPr>
+                    </a:p>
+                  </a:txBody>
+                  <a:tcPr marL="9525" marR="9525" marT="9525" marB="0" anchor="b"/>
+                </a:tc>
+                <a:tc>
+                  <a:txBody>
+                    <a:bodyPr/>
+                    <a:lstStyle/>
+                    <a:p>
+                      <a:pPr algn="ctr" fontAlgn="b"/>
+                      <a:r>
+                        <a:rPr lang="es-MX" sz="1100" u="none" strike="noStrike">
+                          <a:effectLst/>
+                        </a:rPr>
+                        <a:t> </a:t>
+                      </a:r>
+                      <a:endParaRPr lang="es-MX" sz="1100" b="0" i="0" u="none" strike="noStrike">
+                        <a:solidFill>
+                          <a:srgbClr val="000000"/>
+                        </a:solidFill>
+                        <a:effectLst/>
+                        <a:latin typeface="Calibri" panose="020F0502020204030204" pitchFamily="34" charset="0"/>
+                      </a:endParaRPr>
+                    </a:p>
+                  </a:txBody>
+                  <a:tcPr marL="9525" marR="9525" marT="9525" marB="0" anchor="b"/>
+                </a:tc>
+                <a:tc>
+                  <a:txBody>
+                    <a:bodyPr/>
+                    <a:lstStyle/>
+                    <a:p>
+                      <a:pPr algn="l" fontAlgn="b"/>
+                      <a:r>
+                        <a:rPr lang="es-MX" sz="1100" u="none" strike="noStrike">
+                          <a:effectLst/>
+                        </a:rPr>
+                        <a:t>No realizada</a:t>
+                      </a:r>
+                      <a:endParaRPr lang="es-MX" sz="1100" b="0" i="0" u="none" strike="noStrike">
+                        <a:solidFill>
+                          <a:srgbClr val="000000"/>
+                        </a:solidFill>
+                        <a:effectLst/>
+                        <a:latin typeface="Calibri" panose="020F0502020204030204" pitchFamily="34" charset="0"/>
+                      </a:endParaRPr>
+                    </a:p>
+                  </a:txBody>
+                  <a:tcPr marL="9525" marR="9525" marT="9525" marB="0" anchor="b"/>
+                </a:tc>
+              </a:tr>
+              <a:tr h="344045">
+                <a:tc>
+                  <a:txBody>
+                    <a:bodyPr/>
+                    <a:lstStyle/>
+                    <a:p>
+                      <a:pPr algn="r" fontAlgn="b"/>
+                      <a:r>
+                        <a:rPr lang="es-MX" sz="1100" u="none" strike="noStrike">
+                          <a:effectLst/>
+                        </a:rPr>
+                        <a:t>01/05/2015</a:t>
+                      </a:r>
+                      <a:endParaRPr lang="es-MX" sz="1100" b="0" i="0" u="none" strike="noStrike">
+                        <a:solidFill>
+                          <a:srgbClr val="000000"/>
+                        </a:solidFill>
+                        <a:effectLst/>
+                        <a:latin typeface="Calibri" panose="020F0502020204030204" pitchFamily="34" charset="0"/>
+                      </a:endParaRPr>
+                    </a:p>
+                  </a:txBody>
+                  <a:tcPr marL="9525" marR="9525" marT="9525" marB="0" anchor="b"/>
+                </a:tc>
+                <a:tc>
+                  <a:txBody>
+                    <a:bodyPr/>
+                    <a:lstStyle/>
+                    <a:p>
+                      <a:pPr algn="ctr" fontAlgn="b"/>
+                      <a:r>
+                        <a:rPr lang="es-MX" sz="1100" u="none" strike="noStrike">
+                          <a:effectLst/>
+                        </a:rPr>
+                        <a:t>Jovanny Zepeda</a:t>
+                      </a:r>
+                      <a:endParaRPr lang="es-MX" sz="1100" b="0" i="0" u="none" strike="noStrike">
+                        <a:solidFill>
+                          <a:srgbClr val="000000"/>
+                        </a:solidFill>
+                        <a:effectLst/>
+                        <a:latin typeface="Calibri" panose="020F0502020204030204" pitchFamily="34" charset="0"/>
+                      </a:endParaRPr>
+                    </a:p>
+                  </a:txBody>
+                  <a:tcPr marL="9525" marR="9525" marT="9525" marB="0" anchor="b"/>
+                </a:tc>
+                <a:tc>
+                  <a:txBody>
+                    <a:bodyPr/>
+                    <a:lstStyle/>
+                    <a:p>
+                      <a:pPr algn="ctr" fontAlgn="b"/>
+                      <a:r>
+                        <a:rPr lang="es-MX" sz="1100" u="none" strike="noStrike">
+                          <a:effectLst/>
+                        </a:rPr>
+                        <a:t>30/04/2015</a:t>
+                      </a:r>
+                      <a:endParaRPr lang="es-MX" sz="1100" b="0" i="0" u="none" strike="noStrike">
+                        <a:solidFill>
+                          <a:srgbClr val="000000"/>
+                        </a:solidFill>
+                        <a:effectLst/>
+                        <a:latin typeface="Calibri" panose="020F0502020204030204" pitchFamily="34" charset="0"/>
+                      </a:endParaRPr>
+                    </a:p>
+                  </a:txBody>
+                  <a:tcPr marL="9525" marR="9525" marT="9525" marB="0" anchor="b"/>
+                </a:tc>
+                <a:tc>
+                  <a:txBody>
+                    <a:bodyPr/>
+                    <a:lstStyle/>
+                    <a:p>
+                      <a:pPr algn="l" fontAlgn="b"/>
+                      <a:r>
+                        <a:rPr lang="es-MX" sz="1100" u="none" strike="noStrike">
+                          <a:effectLst/>
+                        </a:rPr>
+                        <a:t>Realizada</a:t>
+                      </a:r>
+                      <a:endParaRPr lang="es-MX" sz="1100" b="0" i="0" u="none" strike="noStrike">
+                        <a:solidFill>
+                          <a:srgbClr val="000000"/>
+                        </a:solidFill>
+                        <a:effectLst/>
+                        <a:latin typeface="Calibri" panose="020F0502020204030204" pitchFamily="34" charset="0"/>
+                      </a:endParaRPr>
+                    </a:p>
+                  </a:txBody>
+                  <a:tcPr marL="9525" marR="9525" marT="9525" marB="0" anchor="b"/>
+                </a:tc>
+              </a:tr>
+              <a:tr h="344045">
+                <a:tc>
+                  <a:txBody>
+                    <a:bodyPr/>
+                    <a:lstStyle/>
+                    <a:p>
+                      <a:pPr algn="r" fontAlgn="b"/>
+                      <a:r>
+                        <a:rPr lang="es-MX" sz="1100" u="none" strike="noStrike">
+                          <a:effectLst/>
+                        </a:rPr>
+                        <a:t>08/05/2015</a:t>
+                      </a:r>
+                      <a:endParaRPr lang="es-MX" sz="1100" b="0" i="0" u="none" strike="noStrike">
+                        <a:solidFill>
+                          <a:srgbClr val="000000"/>
+                        </a:solidFill>
+                        <a:effectLst/>
+                        <a:latin typeface="Calibri" panose="020F0502020204030204" pitchFamily="34" charset="0"/>
+                      </a:endParaRPr>
+                    </a:p>
+                  </a:txBody>
+                  <a:tcPr marL="9525" marR="9525" marT="9525" marB="0" anchor="b"/>
+                </a:tc>
+                <a:tc>
+                  <a:txBody>
+                    <a:bodyPr/>
+                    <a:lstStyle/>
+                    <a:p>
+                      <a:pPr algn="ctr" fontAlgn="b"/>
+                      <a:r>
+                        <a:rPr lang="es-MX" sz="1100" u="none" strike="noStrike">
+                          <a:effectLst/>
+                        </a:rPr>
+                        <a:t>Jovanny Zepeda</a:t>
+                      </a:r>
+                      <a:endParaRPr lang="es-MX" sz="1100" b="0" i="0" u="none" strike="noStrike">
+                        <a:solidFill>
+                          <a:srgbClr val="000000"/>
+                        </a:solidFill>
+                        <a:effectLst/>
+                        <a:latin typeface="Calibri" panose="020F0502020204030204" pitchFamily="34" charset="0"/>
+                      </a:endParaRPr>
+                    </a:p>
+                  </a:txBody>
+                  <a:tcPr marL="9525" marR="9525" marT="9525" marB="0" anchor="b"/>
+                </a:tc>
+                <a:tc>
+                  <a:txBody>
+                    <a:bodyPr/>
+                    <a:lstStyle/>
+                    <a:p>
+                      <a:pPr algn="ctr" fontAlgn="b"/>
+                      <a:r>
+                        <a:rPr lang="es-MX" sz="1100" u="none" strike="noStrike">
+                          <a:effectLst/>
+                        </a:rPr>
+                        <a:t>08/05/2015</a:t>
+                      </a:r>
+                      <a:endParaRPr lang="es-MX" sz="1100" b="0" i="0" u="none" strike="noStrike">
+                        <a:solidFill>
+                          <a:srgbClr val="000000"/>
+                        </a:solidFill>
+                        <a:effectLst/>
+                        <a:latin typeface="Calibri" panose="020F0502020204030204" pitchFamily="34" charset="0"/>
+                      </a:endParaRPr>
+                    </a:p>
+                  </a:txBody>
+                  <a:tcPr marL="9525" marR="9525" marT="9525" marB="0" anchor="b"/>
+                </a:tc>
+                <a:tc>
+                  <a:txBody>
+                    <a:bodyPr/>
+                    <a:lstStyle/>
+                    <a:p>
+                      <a:pPr algn="l" fontAlgn="b"/>
+                      <a:r>
+                        <a:rPr lang="es-MX" sz="1100" u="none" strike="noStrike">
+                          <a:effectLst/>
+                        </a:rPr>
+                        <a:t>Realizada</a:t>
+                      </a:r>
+                      <a:endParaRPr lang="es-MX" sz="1100" b="0" i="0" u="none" strike="noStrike">
+                        <a:solidFill>
+                          <a:srgbClr val="000000"/>
+                        </a:solidFill>
+                        <a:effectLst/>
+                        <a:latin typeface="Calibri" panose="020F0502020204030204" pitchFamily="34" charset="0"/>
+                      </a:endParaRPr>
+                    </a:p>
+                  </a:txBody>
+                  <a:tcPr marL="9525" marR="9525" marT="9525" marB="0" anchor="b"/>
+                </a:tc>
+              </a:tr>
+              <a:tr h="344045">
+                <a:tc>
+                  <a:txBody>
+                    <a:bodyPr/>
+                    <a:lstStyle/>
+                    <a:p>
+                      <a:pPr algn="r" fontAlgn="b"/>
+                      <a:r>
+                        <a:rPr lang="es-MX" sz="1100" u="none" strike="noStrike">
+                          <a:effectLst/>
+                        </a:rPr>
+                        <a:t>15/05/2015</a:t>
+                      </a:r>
+                      <a:endParaRPr lang="es-MX" sz="1100" b="0" i="0" u="none" strike="noStrike">
+                        <a:solidFill>
+                          <a:srgbClr val="000000"/>
+                        </a:solidFill>
+                        <a:effectLst/>
+                        <a:latin typeface="Calibri" panose="020F0502020204030204" pitchFamily="34" charset="0"/>
+                      </a:endParaRPr>
+                    </a:p>
+                  </a:txBody>
+                  <a:tcPr marL="9525" marR="9525" marT="9525" marB="0" anchor="b"/>
+                </a:tc>
+                <a:tc>
+                  <a:txBody>
+                    <a:bodyPr/>
+                    <a:lstStyle/>
+                    <a:p>
+                      <a:pPr algn="ctr" fontAlgn="b"/>
+                      <a:r>
+                        <a:rPr lang="es-MX" sz="1100" u="none" strike="noStrike">
+                          <a:effectLst/>
+                        </a:rPr>
+                        <a:t>Jovanny Zepeda</a:t>
+                      </a:r>
+                      <a:endParaRPr lang="es-MX" sz="1100" b="0" i="0" u="none" strike="noStrike">
+                        <a:solidFill>
+                          <a:srgbClr val="000000"/>
+                        </a:solidFill>
+                        <a:effectLst/>
+                        <a:latin typeface="Calibri" panose="020F0502020204030204" pitchFamily="34" charset="0"/>
+                      </a:endParaRPr>
+                    </a:p>
+                  </a:txBody>
+                  <a:tcPr marL="9525" marR="9525" marT="9525" marB="0" anchor="b"/>
+                </a:tc>
+                <a:tc>
+                  <a:txBody>
+                    <a:bodyPr/>
+                    <a:lstStyle/>
+                    <a:p>
+                      <a:pPr algn="ctr" fontAlgn="b"/>
+                      <a:r>
+                        <a:rPr lang="es-MX" sz="1100" u="none" strike="noStrike">
+                          <a:effectLst/>
+                        </a:rPr>
+                        <a:t>15/05/2015</a:t>
+                      </a:r>
+                      <a:endParaRPr lang="es-MX" sz="1100" b="0" i="0" u="none" strike="noStrike">
+                        <a:solidFill>
+                          <a:srgbClr val="000000"/>
+                        </a:solidFill>
+                        <a:effectLst/>
+                        <a:latin typeface="Calibri" panose="020F0502020204030204" pitchFamily="34" charset="0"/>
+                      </a:endParaRPr>
+                    </a:p>
+                  </a:txBody>
+                  <a:tcPr marL="9525" marR="9525" marT="9525" marB="0" anchor="b"/>
+                </a:tc>
+                <a:tc>
+                  <a:txBody>
+                    <a:bodyPr/>
+                    <a:lstStyle/>
+                    <a:p>
+                      <a:pPr algn="l" fontAlgn="b"/>
+                      <a:r>
+                        <a:rPr lang="es-MX" sz="1100" u="none" strike="noStrike">
+                          <a:effectLst/>
+                        </a:rPr>
+                        <a:t>Realizada</a:t>
+                      </a:r>
+                      <a:endParaRPr lang="es-MX" sz="1100" b="0" i="0" u="none" strike="noStrike">
+                        <a:solidFill>
+                          <a:srgbClr val="000000"/>
+                        </a:solidFill>
+                        <a:effectLst/>
+                        <a:latin typeface="Calibri" panose="020F0502020204030204" pitchFamily="34" charset="0"/>
+                      </a:endParaRPr>
+                    </a:p>
+                  </a:txBody>
+                  <a:tcPr marL="9525" marR="9525" marT="9525" marB="0" anchor="b"/>
+                </a:tc>
+              </a:tr>
+              <a:tr h="344045">
+                <a:tc>
+                  <a:txBody>
+                    <a:bodyPr/>
+                    <a:lstStyle/>
+                    <a:p>
+                      <a:pPr algn="r" fontAlgn="b"/>
+                      <a:r>
+                        <a:rPr lang="es-MX" sz="1100" u="none" strike="noStrike">
+                          <a:effectLst/>
+                        </a:rPr>
+                        <a:t>22/05/2015</a:t>
+                      </a:r>
+                      <a:endParaRPr lang="es-MX" sz="1100" b="0" i="0" u="none" strike="noStrike">
+                        <a:solidFill>
+                          <a:srgbClr val="000000"/>
+                        </a:solidFill>
+                        <a:effectLst/>
+                        <a:latin typeface="Calibri" panose="020F0502020204030204" pitchFamily="34" charset="0"/>
+                      </a:endParaRPr>
+                    </a:p>
+                  </a:txBody>
+                  <a:tcPr marL="9525" marR="9525" marT="9525" marB="0" anchor="b"/>
+                </a:tc>
+                <a:tc>
+                  <a:txBody>
+                    <a:bodyPr/>
+                    <a:lstStyle/>
+                    <a:p>
+                      <a:pPr algn="ctr" fontAlgn="b"/>
+                      <a:r>
+                        <a:rPr lang="es-MX" sz="1100" u="none" strike="noStrike">
+                          <a:effectLst/>
+                        </a:rPr>
+                        <a:t>Jovanny Zepeda</a:t>
+                      </a:r>
+                      <a:endParaRPr lang="es-MX" sz="1100" b="0" i="0" u="none" strike="noStrike">
+                        <a:solidFill>
+                          <a:srgbClr val="000000"/>
+                        </a:solidFill>
+                        <a:effectLst/>
+                        <a:latin typeface="Calibri" panose="020F0502020204030204" pitchFamily="34" charset="0"/>
+                      </a:endParaRPr>
+                    </a:p>
+                  </a:txBody>
+                  <a:tcPr marL="9525" marR="9525" marT="9525" marB="0" anchor="b"/>
+                </a:tc>
+                <a:tc>
+                  <a:txBody>
+                    <a:bodyPr/>
+                    <a:lstStyle/>
+                    <a:p>
+                      <a:pPr algn="ctr" fontAlgn="b"/>
+                      <a:r>
+                        <a:rPr lang="es-MX" sz="1100" u="none" strike="noStrike">
+                          <a:effectLst/>
+                        </a:rPr>
+                        <a:t>22/05/2015</a:t>
+                      </a:r>
+                      <a:endParaRPr lang="es-MX" sz="1100" b="0" i="0" u="none" strike="noStrike">
+                        <a:solidFill>
+                          <a:srgbClr val="000000"/>
+                        </a:solidFill>
+                        <a:effectLst/>
+                        <a:latin typeface="Calibri" panose="020F0502020204030204" pitchFamily="34" charset="0"/>
+                      </a:endParaRPr>
+                    </a:p>
+                  </a:txBody>
+                  <a:tcPr marL="9525" marR="9525" marT="9525" marB="0" anchor="b"/>
+                </a:tc>
+                <a:tc>
+                  <a:txBody>
+                    <a:bodyPr/>
+                    <a:lstStyle/>
+                    <a:p>
+                      <a:pPr algn="l" fontAlgn="b"/>
+                      <a:r>
+                        <a:rPr lang="es-MX" sz="1100" u="none" strike="noStrike" dirty="0">
+                          <a:effectLst/>
+                        </a:rPr>
+                        <a:t>Realizada</a:t>
+                      </a:r>
+                      <a:endParaRPr lang="es-MX" sz="1100" b="0" i="0" u="none" strike="noStrike" dirty="0">
+                        <a:solidFill>
+                          <a:srgbClr val="000000"/>
+                        </a:solidFill>
+                        <a:effectLst/>
+                        <a:latin typeface="Calibri" panose="020F0502020204030204" pitchFamily="34" charset="0"/>
+                      </a:endParaRPr>
+                    </a:p>
+                  </a:txBody>
+                  <a:tcPr marL="9525" marR="9525" marT="9525" marB="0" anchor="b"/>
+                </a:tc>
+              </a:tr>
+            </a:tbl>
+          </a:graphicData>
+        </a:graphic>
+      </p:graphicFrame>
+    </p:spTree>
+    <p:extLst>
+      <p:ext uri="{BB962C8B-B14F-4D97-AF65-F5344CB8AC3E}">
+        <p14:creationId xmlns:p14="http://schemas.microsoft.com/office/powerpoint/2010/main" val="2516881083"/>
+      </p:ext>
+    </p:extLst>
+  </p:cSld>
+  <p:clrMapOvr>
+    <a:masterClrMapping/>
+  </p:clrMapOvr>
+</p:sld>
+</file>
+
 <file path=ppt/slides/slide2.xml><?xml version="1.0" encoding="utf-8"?>
 <p:sld xmlns:a="http://schemas.openxmlformats.org/drawingml/2006/main" xmlns:r="http://schemas.openxmlformats.org/officeDocument/2006/relationships" xmlns:p="http://schemas.openxmlformats.org/presentationml/2006/main">
   <p:cSld>
@@ -6062,14 +8618,14 @@
           <p:nvPr>
             <p:extLst>
               <p:ext uri="{D42A27DB-BD31-4B8C-83A1-F6EECF244321}">
-                <p14:modId xmlns:p14="http://schemas.microsoft.com/office/powerpoint/2010/main" val="3921050492"/>
+                <p14:modId xmlns:p14="http://schemas.microsoft.com/office/powerpoint/2010/main" val="3557503969"/>
               </p:ext>
             </p:extLst>
           </p:nvPr>
         </p:nvGraphicFramePr>
         <p:xfrm>
           <a:off x="1524000" y="1397000"/>
-          <a:ext cx="6096000" cy="741680"/>
+          <a:ext cx="6096000" cy="2296160"/>
         </p:xfrm>
         <a:graphic>
           <a:graphicData uri="http://schemas.openxmlformats.org/drawingml/2006/table">
@@ -6169,6 +8725,119 @@
                       <a:r>
                         <a:rPr lang="es-MX" dirty="0" smtClean="0"/>
                         <a:t>09-02-15</a:t>
+                      </a:r>
+                      <a:endParaRPr lang="es-MX" dirty="0"/>
+                    </a:p>
+                  </a:txBody>
+                  <a:tcPr/>
+                </a:tc>
+              </a:tr>
+              <a:tr h="370840">
+                <a:tc>
+                  <a:txBody>
+                    <a:bodyPr/>
+                    <a:lstStyle/>
+                    <a:p>
+                      <a:pPr algn="ctr"/>
+                      <a:r>
+                        <a:rPr lang="es-MX" dirty="0" smtClean="0"/>
+                        <a:t>Contratos Clientes</a:t>
+                      </a:r>
+                      <a:endParaRPr lang="es-MX" dirty="0"/>
+                    </a:p>
+                  </a:txBody>
+                  <a:tcPr/>
+                </a:tc>
+                <a:tc>
+                  <a:txBody>
+                    <a:bodyPr/>
+                    <a:lstStyle/>
+                    <a:p>
+                      <a:pPr algn="ctr"/>
+                      <a:r>
+                        <a:rPr lang="es-MX" dirty="0" smtClean="0"/>
+                        <a:t>16-03-15</a:t>
+                      </a:r>
+                      <a:endParaRPr lang="es-MX" dirty="0"/>
+                    </a:p>
+                  </a:txBody>
+                  <a:tcPr/>
+                </a:tc>
+                <a:tc>
+                  <a:txBody>
+                    <a:bodyPr/>
+                    <a:lstStyle/>
+                    <a:p>
+                      <a:pPr algn="ctr"/>
+                      <a:r>
+                        <a:rPr lang="es-MX" dirty="0" smtClean="0"/>
+                        <a:t>01-04-15</a:t>
+                      </a:r>
+                      <a:endParaRPr lang="es-MX" dirty="0"/>
+                    </a:p>
+                  </a:txBody>
+                  <a:tcPr/>
+                </a:tc>
+              </a:tr>
+              <a:tr h="370840">
+                <a:tc>
+                  <a:txBody>
+                    <a:bodyPr/>
+                    <a:lstStyle/>
+                    <a:p>
+                      <a:pPr algn="ctr"/>
+                      <a:r>
+                        <a:rPr lang="es-MX" dirty="0" smtClean="0"/>
+                        <a:t>Mitigación problemas tratables</a:t>
+                      </a:r>
+                      <a:endParaRPr lang="es-MX" dirty="0"/>
+                    </a:p>
+                  </a:txBody>
+                  <a:tcPr/>
+                </a:tc>
+                <a:tc>
+                  <a:txBody>
+                    <a:bodyPr/>
+                    <a:lstStyle/>
+                    <a:p>
+                      <a:pPr marL="0" marR="0" indent="0" algn="ctr" defTabSz="914400" eaLnBrk="1" fontAlgn="auto" latinLnBrk="0" hangingPunct="1">
+                        <a:lnSpc>
+                          <a:spcPct val="100000"/>
+                        </a:lnSpc>
+                        <a:spcBef>
+                          <a:spcPts val="0"/>
+                        </a:spcBef>
+                        <a:spcAft>
+                          <a:spcPts val="0"/>
+                        </a:spcAft>
+                        <a:buClrTx/>
+                        <a:buSzTx/>
+                        <a:buFontTx/>
+                        <a:buNone/>
+                        <a:tabLst/>
+                        <a:defRPr/>
+                      </a:pPr>
+                      <a:r>
+                        <a:rPr lang="es-MX" dirty="0" smtClean="0"/>
+                        <a:t>29-05-15</a:t>
+                      </a:r>
+                    </a:p>
+                    <a:p>
+                      <a:pPr algn="ctr"/>
+                      <a:endParaRPr lang="es-MX" dirty="0"/>
+                    </a:p>
+                  </a:txBody>
+                  <a:tcPr/>
+                </a:tc>
+                <a:tc>
+                  <a:txBody>
+                    <a:bodyPr/>
+                    <a:lstStyle/>
+                    <a:p>
+                      <a:pPr algn="ctr"/>
+                      <a:r>
+                        <a:rPr lang="es-MX" dirty="0" smtClean="0"/>
+                        <a:t>29-05-15</a:t>
                       </a:r>
                       <a:endParaRPr lang="es-MX" dirty="0"/>
                     </a:p>
@@ -6506,10 +9175,10 @@
       </p:sp>
       <p:graphicFrame>
         <p:nvGraphicFramePr>
-          <p:cNvPr id="8" name="2 Gráfico">
+          <p:cNvPr id="6" name="1 Gráfico">
             <a:extLst>
               <a:ext uri="{FF2B5EF4-FFF2-40B4-BE49-F238E27FC236}">
-                <a16:creationId xmlns:xdr="http://schemas.openxmlformats.org/drawingml/2006/spreadsheetDrawing" xmlns:a16="http://schemas.microsoft.com/office/drawing/2014/main" xmlns="" xmlns:lc="http://schemas.openxmlformats.org/drawingml/2006/lockedCanvas" id="{00000000-0008-0000-0200-000003000000}"/>
+                <a16:creationId xmlns:lc="http://schemas.openxmlformats.org/drawingml/2006/lockedCanvas" xmlns="" xmlns:a16="http://schemas.microsoft.com/office/drawing/2014/main" xmlns:xdr="http://schemas.openxmlformats.org/drawingml/2006/spreadsheetDrawing" id="{00000000-0008-0000-0200-000002000000}"/>
               </a:ext>
             </a:extLst>
           </p:cNvPr>
@@ -6519,14 +9188,14 @@
           <p:nvPr>
             <p:extLst>
               <p:ext uri="{D42A27DB-BD31-4B8C-83A1-F6EECF244321}">
-                <p14:modId xmlns:p14="http://schemas.microsoft.com/office/powerpoint/2010/main" val="4018774879"/>
+                <p14:modId xmlns:p14="http://schemas.microsoft.com/office/powerpoint/2010/main" val="1479040880"/>
               </p:ext>
             </p:extLst>
           </p:nvPr>
         </p:nvGraphicFramePr>
         <p:xfrm>
-          <a:off x="611560" y="1124744"/>
-          <a:ext cx="4565650" cy="2800350"/>
+          <a:off x="457200" y="1052736"/>
+          <a:ext cx="4667250" cy="2819400"/>
         </p:xfrm>
         <a:graphic>
           <a:graphicData uri="http://schemas.openxmlformats.org/drawingml/2006/chart">
@@ -6536,10 +9205,10 @@
       </p:graphicFrame>
       <p:graphicFrame>
         <p:nvGraphicFramePr>
-          <p:cNvPr id="9" name="1 Gráfico">
+          <p:cNvPr id="7" name="2 Gráfico">
             <a:extLst>
               <a:ext uri="{FF2B5EF4-FFF2-40B4-BE49-F238E27FC236}">
-                <a16:creationId xmlns:xdr="http://schemas.openxmlformats.org/drawingml/2006/spreadsheetDrawing" xmlns:a16="http://schemas.microsoft.com/office/drawing/2014/main" xmlns="" xmlns:lc="http://schemas.openxmlformats.org/drawingml/2006/lockedCanvas" id="{00000000-0008-0000-0200-000002000000}"/>
+                <a16:creationId xmlns:lc="http://schemas.openxmlformats.org/drawingml/2006/lockedCanvas" xmlns="" xmlns:a16="http://schemas.microsoft.com/office/drawing/2014/main" xmlns:xdr="http://schemas.openxmlformats.org/drawingml/2006/spreadsheetDrawing" id="{00000000-0008-0000-0200-000003000000}"/>
               </a:ext>
             </a:extLst>
           </p:cNvPr>
@@ -6549,14 +9218,14 @@
           <p:nvPr>
             <p:extLst>
               <p:ext uri="{D42A27DB-BD31-4B8C-83A1-F6EECF244321}">
-                <p14:modId xmlns:p14="http://schemas.microsoft.com/office/powerpoint/2010/main" val="2815238363"/>
+                <p14:modId xmlns:p14="http://schemas.microsoft.com/office/powerpoint/2010/main" val="2242610820"/>
               </p:ext>
             </p:extLst>
           </p:nvPr>
         </p:nvGraphicFramePr>
         <p:xfrm>
-          <a:off x="4443863" y="4038600"/>
-          <a:ext cx="4667250" cy="2819400"/>
+          <a:off x="4150257" y="4057686"/>
+          <a:ext cx="4565650" cy="2800350"/>
         </p:xfrm>
         <a:graphic>
           <a:graphicData uri="http://schemas.openxmlformats.org/drawingml/2006/chart">
@@ -6564,6 +9233,36 @@
           </a:graphicData>
         </a:graphic>
       </p:graphicFrame>
+      <p:sp>
+        <p:nvSpPr>
+          <p:cNvPr id="2" name="CuadroTexto 1"/>
+          <p:cNvSpPr txBox="1"/>
+          <p:nvPr/>
+        </p:nvSpPr>
+        <p:spPr>
+          <a:xfrm>
+            <a:off x="5220072" y="1268760"/>
+            <a:ext cx="3465288" cy="1477328"/>
+          </a:xfrm>
+          <a:prstGeom prst="rect">
+            <a:avLst/>
+          </a:prstGeom>
+          <a:noFill/>
+        </p:spPr>
+        <p:txBody>
+          <a:bodyPr wrap="square" rtlCol="0">
+            <a:spAutoFit/>
+          </a:bodyPr>
+          <a:lstStyle/>
+          <a:p>
+            <a:r>
+              <a:rPr lang="es-MX" dirty="0" smtClean="0"/>
+              <a:t>Tras lo acordado en la Reunión de monitoreo la sesión anterior se deja de dar señalamiento en la desviación existente en costos y esfuerzos.</a:t>
+            </a:r>
+            <a:endParaRPr lang="es-MX" dirty="0"/>
+          </a:p>
+        </p:txBody>
+      </p:sp>
     </p:spTree>
   </p:cSld>
   <p:clrMapOvr>
@@ -6689,10 +9388,10 @@
       </p:sp>
       <p:graphicFrame>
         <p:nvGraphicFramePr>
-          <p:cNvPr id="8" name="2 Gráfico">
+          <p:cNvPr id="6" name="2 Gráfico">
             <a:extLst>
               <a:ext uri="{FF2B5EF4-FFF2-40B4-BE49-F238E27FC236}">
-                <a16:creationId xmlns:xdr="http://schemas.openxmlformats.org/drawingml/2006/spreadsheetDrawing" xmlns:a16="http://schemas.microsoft.com/office/drawing/2014/main" xmlns="" xmlns:lc="http://schemas.openxmlformats.org/drawingml/2006/lockedCanvas" id="{00000000-0008-0000-0100-000003000000}"/>
+                <a16:creationId xmlns:lc="http://schemas.openxmlformats.org/drawingml/2006/lockedCanvas" xmlns="" xmlns:a16="http://schemas.microsoft.com/office/drawing/2014/main" xmlns:xdr="http://schemas.openxmlformats.org/drawingml/2006/spreadsheetDrawing" id="{00000000-0008-0000-0100-000003000000}"/>
               </a:ext>
             </a:extLst>
           </p:cNvPr>
@@ -6702,13 +9401,13 @@
           <p:nvPr>
             <p:extLst>
               <p:ext uri="{D42A27DB-BD31-4B8C-83A1-F6EECF244321}">
-                <p14:modId xmlns:p14="http://schemas.microsoft.com/office/powerpoint/2010/main" val="750283841"/>
+                <p14:modId xmlns:p14="http://schemas.microsoft.com/office/powerpoint/2010/main" val="2958235469"/>
               </p:ext>
             </p:extLst>
           </p:nvPr>
         </p:nvGraphicFramePr>
         <p:xfrm>
-          <a:off x="655055" y="1268760"/>
+          <a:off x="451484" y="980728"/>
           <a:ext cx="8011584" cy="2800350"/>
         </p:xfrm>
         <a:graphic>
@@ -6719,10 +9418,10 @@
       </p:graphicFrame>
       <p:graphicFrame>
         <p:nvGraphicFramePr>
-          <p:cNvPr id="9" name="4 Gráfico">
+          <p:cNvPr id="7" name="4 Gráfico">
             <a:extLst>
               <a:ext uri="{FF2B5EF4-FFF2-40B4-BE49-F238E27FC236}">
-                <a16:creationId xmlns:xdr="http://schemas.openxmlformats.org/drawingml/2006/spreadsheetDrawing" xmlns:a16="http://schemas.microsoft.com/office/drawing/2014/main" xmlns="" xmlns:lc="http://schemas.openxmlformats.org/drawingml/2006/lockedCanvas" id="{00000000-0008-0000-0100-000005000000}"/>
+                <a16:creationId xmlns:lc="http://schemas.openxmlformats.org/drawingml/2006/lockedCanvas" xmlns="" xmlns:a16="http://schemas.microsoft.com/office/drawing/2014/main" xmlns:xdr="http://schemas.openxmlformats.org/drawingml/2006/spreadsheetDrawing" id="{00000000-0008-0000-0100-000005000000}"/>
               </a:ext>
             </a:extLst>
           </p:cNvPr>
@@ -6732,13 +9431,13 @@
           <p:nvPr>
             <p:extLst>
               <p:ext uri="{D42A27DB-BD31-4B8C-83A1-F6EECF244321}">
-                <p14:modId xmlns:p14="http://schemas.microsoft.com/office/powerpoint/2010/main" val="3346884679"/>
+                <p14:modId xmlns:p14="http://schemas.microsoft.com/office/powerpoint/2010/main" val="2238191513"/>
               </p:ext>
             </p:extLst>
           </p:nvPr>
         </p:nvGraphicFramePr>
         <p:xfrm>
-          <a:off x="449144" y="4045467"/>
+          <a:off x="0" y="3717032"/>
           <a:ext cx="7495117" cy="2800350"/>
         </p:xfrm>
         <a:graphic>

</xml_diff>